<commit_message>
add ocv slide to 2-; create ppt 1-
</commit_message>
<xml_diff>
--- a/doc/2-Tegra系统生态环境与开发配置.pptx
+++ b/doc/2-Tegra系统生态环境与开发配置.pptx
@@ -5,10 +5,10 @@
     <p:sldMasterId id="2147483784" r:id="rId4"/>
   </p:sldMasterIdLst>
   <p:notesMasterIdLst>
-    <p:notesMasterId r:id="rId22"/>
+    <p:notesMasterId r:id="rId23"/>
   </p:notesMasterIdLst>
   <p:handoutMasterIdLst>
-    <p:handoutMasterId r:id="rId23"/>
+    <p:handoutMasterId r:id="rId24"/>
   </p:handoutMasterIdLst>
   <p:sldIdLst>
     <p:sldId id="1017" r:id="rId5"/>
@@ -24,10 +24,11 @@
     <p:sldId id="1045" r:id="rId15"/>
     <p:sldId id="1046" r:id="rId16"/>
     <p:sldId id="1049" r:id="rId17"/>
-    <p:sldId id="1042" r:id="rId18"/>
-    <p:sldId id="1043" r:id="rId19"/>
-    <p:sldId id="1044" r:id="rId20"/>
-    <p:sldId id="1050" r:id="rId21"/>
+    <p:sldId id="1051" r:id="rId18"/>
+    <p:sldId id="1042" r:id="rId19"/>
+    <p:sldId id="1043" r:id="rId20"/>
+    <p:sldId id="1044" r:id="rId21"/>
+    <p:sldId id="1050" r:id="rId22"/>
   </p:sldIdLst>
   <p:sldSz cx="10972800" cy="6172200"/>
   <p:notesSz cx="7010400" cy="9296400"/>
@@ -801,11 +802,7 @@
           <a:p>
             <a:r>
               <a:rPr lang="en-US" altLang="zh-CN" dirty="0" smtClean="0"/>
-              <a:t>cuda-install-samples-6.5.sh </a:t>
-            </a:r>
-            <a:r>
-              <a:rPr lang="en-US" altLang="zh-CN" dirty="0" smtClean="0"/>
-              <a:t>/home/ubuntu </a:t>
+              <a:t>cuda-install-samples-6.5.sh /home/ubuntu </a:t>
             </a:r>
           </a:p>
           <a:p>
@@ -820,11 +817,7 @@
           <a:p>
             <a:r>
               <a:rPr lang="en-US" altLang="zh-CN" dirty="0" smtClean="0"/>
-              <a:t>cd ~/</a:t>
-            </a:r>
-            <a:r>
-              <a:rPr lang="en-US" altLang="zh-CN" dirty="0" smtClean="0"/>
-              <a:t>NVIDIA_CUDA-6.5_Samples/1_Utilities/</a:t>
+              <a:t>cd ~/NVIDIA_CUDA-6.5_Samples/1_Utilities/</a:t>
             </a:r>
             <a:r>
               <a:rPr lang="en-US" altLang="zh-CN" dirty="0" err="1" smtClean="0"/>
@@ -1045,7 +1038,6 @@
               <a:rPr lang="en-US" altLang="zh-CN" dirty="0" smtClean="0"/>
               <a:t> </a:t>
             </a:r>
-            <a:endParaRPr lang="en-US" altLang="zh-CN" dirty="0" smtClean="0"/>
           </a:p>
           <a:p>
             <a:r>
@@ -1075,13 +1067,8 @@
           <a:p>
             <a:r>
               <a:rPr lang="en-US" altLang="zh-CN" dirty="0" smtClean="0"/>
-              <a:t>sudo dpkg -i </a:t>
-            </a:r>
-            <a:r>
-              <a:rPr lang="en-US" altLang="zh-CN" dirty="0" smtClean="0"/>
-              <a:t>libopencv4tegra-repo_l4t-r21_2.4.10.1_armhf.deb </a:t>
-            </a:r>
-            <a:endParaRPr lang="en-US" altLang="zh-CN" dirty="0" smtClean="0"/>
+              <a:t>sudo dpkg -i libopencv4tegra-repo_l4t-r21_2.4.10.1_armhf.deb </a:t>
+            </a:r>
           </a:p>
           <a:p>
             <a:r>
@@ -1092,13 +1079,8 @@
           <a:p>
             <a:r>
               <a:rPr lang="en-US" altLang="zh-CN" dirty="0" smtClean="0"/>
-              <a:t>sudo apt-get install </a:t>
-            </a:r>
-            <a:r>
-              <a:rPr lang="en-US" altLang="zh-CN" dirty="0" smtClean="0"/>
-              <a:t>cuda-toolkit-6-5 </a:t>
-            </a:r>
-            <a:endParaRPr lang="en-US" altLang="zh-CN" dirty="0" smtClean="0"/>
+              <a:t>sudo apt-get install cuda-toolkit-6-5 </a:t>
+            </a:r>
           </a:p>
           <a:p>
             <a:r>
@@ -1267,13 +1249,8 @@
             </a:pPr>
             <a:r>
               <a:rPr lang="en-US" altLang="zh-CN" dirty="0" smtClean="0"/>
-              <a:t># </a:t>
-            </a:r>
-            <a:r>
-              <a:rPr lang="en-US" altLang="zh-CN" dirty="0" smtClean="0"/>
-              <a:t>extract</a:t>
-            </a:r>
-            <a:endParaRPr lang="en-US" altLang="zh-CN" dirty="0" smtClean="0"/>
+              <a:t># extract</a:t>
+            </a:r>
           </a:p>
           <a:p>
             <a:r>
@@ -1292,7 +1269,6 @@
               <a:rPr lang="en-US" altLang="zh-CN" dirty="0" smtClean="0"/>
               <a:t> opencv-2.4.10.tar.gz</a:t>
             </a:r>
-            <a:endParaRPr lang="en-US" altLang="zh-CN" dirty="0" smtClean="0"/>
           </a:p>
           <a:p>
             <a:endParaRPr lang="en-US" altLang="zh-CN" dirty="0" smtClean="0"/>
@@ -1306,11 +1282,7 @@
           <a:p>
             <a:r>
               <a:rPr lang="en-US" altLang="zh-CN" dirty="0" smtClean="0"/>
-              <a:t>cd </a:t>
-            </a:r>
-            <a:r>
-              <a:rPr lang="en-US" altLang="zh-CN" dirty="0" smtClean="0"/>
-              <a:t>opencv-2.4.10/samples/</a:t>
+              <a:t>cd opencv-2.4.10/samples/</a:t>
             </a:r>
             <a:r>
               <a:rPr lang="en-US" altLang="zh-CN" dirty="0" err="1" smtClean="0"/>
@@ -1679,7 +1651,6 @@
               <a:rPr lang="en-US" altLang="zh-CN" dirty="0" smtClean="0"/>
               <a:t>/logo_in_clutter.png</a:t>
             </a:r>
-            <a:endParaRPr lang="en-US" altLang="zh-CN" dirty="0" smtClean="0"/>
           </a:p>
           <a:p>
             <a:endParaRPr lang="zh-CN" altLang="en-US" dirty="0"/>
@@ -1772,18 +1743,7 @@
           <a:bodyPr/>
           <a:lstStyle/>
           <a:p>
-            <a:r>
-              <a:rPr lang="zh-CN" altLang="en-US" dirty="0" smtClean="0"/>
-              <a:t>参考：</a:t>
-            </a:r>
-            <a:endParaRPr lang="en-US" altLang="zh-CN" dirty="0" smtClean="0"/>
-          </a:p>
-          <a:p>
-            <a:r>
-              <a:rPr lang="en-US" altLang="zh-CN" dirty="0" smtClean="0"/>
-              <a:t>http://soulsheng.1kapp.com/it/?p=1709 </a:t>
-            </a:r>
-            <a:endParaRPr lang="en-US" altLang="zh-CN" dirty="0"/>
+            <a:endParaRPr lang="zh-CN" altLang="en-US" dirty="0"/>
           </a:p>
         </p:txBody>
       </p:sp>
@@ -1873,6 +1833,17 @@
           <a:bodyPr/>
           <a:lstStyle/>
           <a:p>
+            <a:r>
+              <a:rPr lang="zh-CN" altLang="en-US" dirty="0" smtClean="0"/>
+              <a:t>参考：</a:t>
+            </a:r>
+            <a:endParaRPr lang="en-US" altLang="zh-CN" dirty="0" smtClean="0"/>
+          </a:p>
+          <a:p>
+            <a:r>
+              <a:rPr lang="en-US" altLang="zh-CN" dirty="0" smtClean="0"/>
+              <a:t>http://soulsheng.1kapp.com/it/?p=1709 </a:t>
+            </a:r>
             <a:endParaRPr lang="en-US" altLang="zh-CN" dirty="0"/>
           </a:p>
         </p:txBody>
@@ -2053,14 +2024,6 @@
           <a:bodyPr/>
           <a:lstStyle/>
           <a:p>
-            <a:r>
-              <a:rPr lang="en-US" altLang="zh-CN" sz="1100" dirty="0" smtClean="0"/>
-              <a:t>vim</a:t>
-            </a:r>
-            <a:r>
-              <a:rPr lang="zh-CN" altLang="en-US" sz="1100" dirty="0" smtClean="0"/>
-              <a:t>使用手册</a:t>
-            </a:r>
             <a:endParaRPr lang="en-US" altLang="zh-CN" dirty="0"/>
           </a:p>
         </p:txBody>
@@ -2089,6 +2052,104 @@
                 <a:defRPr/>
               </a:pPr>
               <a:t>17</a:t>
+            </a:fld>
+            <a:endParaRPr lang="en-US" dirty="0"/>
+          </a:p>
+        </p:txBody>
+      </p:sp>
+    </p:spTree>
+    <p:extLst>
+      <p:ext uri="{BB962C8B-B14F-4D97-AF65-F5344CB8AC3E}">
+        <p14:creationId xmlns:p14="http://schemas.microsoft.com/office/powerpoint/2010/main" val="2943062953"/>
+      </p:ext>
+    </p:extLst>
+  </p:cSld>
+  <p:clrMapOvr>
+    <a:masterClrMapping/>
+  </p:clrMapOvr>
+</p:notes>
+</file>
+
+<file path=ppt/notesSlides/notesSlide18.xml><?xml version="1.0" encoding="utf-8"?>
+<p:notes xmlns:a="http://schemas.openxmlformats.org/drawingml/2006/main" xmlns:r="http://schemas.openxmlformats.org/officeDocument/2006/relationships" xmlns:p="http://schemas.openxmlformats.org/presentationml/2006/main">
+  <p:cSld>
+    <p:spTree>
+      <p:nvGrpSpPr>
+        <p:cNvPr id="1" name=""/>
+        <p:cNvGrpSpPr/>
+        <p:nvPr/>
+      </p:nvGrpSpPr>
+      <p:grpSpPr>
+        <a:xfrm>
+          <a:off x="0" y="0"/>
+          <a:ext cx="0" cy="0"/>
+          <a:chOff x="0" y="0"/>
+          <a:chExt cx="0" cy="0"/>
+        </a:xfrm>
+      </p:grpSpPr>
+      <p:sp>
+        <p:nvSpPr>
+          <p:cNvPr id="2" name="幻灯片图像占位符 1"/>
+          <p:cNvSpPr>
+            <a:spLocks noGrp="1" noRot="1" noChangeAspect="1"/>
+          </p:cNvSpPr>
+          <p:nvPr>
+            <p:ph type="sldImg"/>
+          </p:nvPr>
+        </p:nvSpPr>
+        <p:spPr/>
+      </p:sp>
+      <p:sp>
+        <p:nvSpPr>
+          <p:cNvPr id="3" name="备注占位符 2"/>
+          <p:cNvSpPr>
+            <a:spLocks noGrp="1"/>
+          </p:cNvSpPr>
+          <p:nvPr>
+            <p:ph type="body" idx="1"/>
+          </p:nvPr>
+        </p:nvSpPr>
+        <p:spPr/>
+        <p:txBody>
+          <a:bodyPr/>
+          <a:lstStyle/>
+          <a:p>
+            <a:r>
+              <a:rPr lang="en-US" altLang="zh-CN" sz="1100" dirty="0" smtClean="0"/>
+              <a:t>vim</a:t>
+            </a:r>
+            <a:r>
+              <a:rPr lang="zh-CN" altLang="en-US" sz="1100" dirty="0" smtClean="0"/>
+              <a:t>使用手册</a:t>
+            </a:r>
+            <a:endParaRPr lang="en-US" altLang="zh-CN" dirty="0"/>
+          </a:p>
+        </p:txBody>
+      </p:sp>
+      <p:sp>
+        <p:nvSpPr>
+          <p:cNvPr id="4" name="灯片编号占位符 3"/>
+          <p:cNvSpPr>
+            <a:spLocks noGrp="1"/>
+          </p:cNvSpPr>
+          <p:nvPr>
+            <p:ph type="sldNum" sz="quarter" idx="10"/>
+          </p:nvPr>
+        </p:nvSpPr>
+        <p:spPr/>
+        <p:txBody>
+          <a:bodyPr/>
+          <a:lstStyle/>
+          <a:p>
+            <a:pPr>
+              <a:defRPr/>
+            </a:pPr>
+            <a:fld id="{E02D639A-AF38-4D9A-897E-57859A70BDEB}" type="slidenum">
+              <a:rPr lang="en-US" smtClean="0"/>
+              <a:pPr>
+                <a:defRPr/>
+              </a:pPr>
+              <a:t>18</a:t>
             </a:fld>
             <a:endParaRPr lang="en-US" dirty="0"/>
           </a:p>
@@ -2821,7 +2882,6 @@
               <a:rPr lang="en-US" altLang="zh-CN" dirty="0" smtClean="0"/>
               <a:t> </a:t>
             </a:r>
-            <a:endParaRPr lang="en-US" altLang="zh-CN" dirty="0" smtClean="0"/>
           </a:p>
           <a:p>
             <a:r>
@@ -2851,13 +2911,8 @@
           <a:p>
             <a:r>
               <a:rPr lang="en-US" altLang="zh-CN" dirty="0" smtClean="0"/>
-              <a:t>sudo dpkg -i </a:t>
-            </a:r>
-            <a:r>
-              <a:rPr lang="en-US" altLang="zh-CN" dirty="0" smtClean="0"/>
-              <a:t>cuda-repo-l4t-r21.2-6-5-prod_6.5-34_armhf.deb </a:t>
-            </a:r>
-            <a:endParaRPr lang="en-US" altLang="zh-CN" dirty="0" smtClean="0"/>
+              <a:t>sudo dpkg -i cuda-repo-l4t-r21.2-6-5-prod_6.5-34_armhf.deb </a:t>
+            </a:r>
           </a:p>
           <a:p>
             <a:r>
@@ -2868,13 +2923,8 @@
           <a:p>
             <a:r>
               <a:rPr lang="en-US" altLang="zh-CN" dirty="0" smtClean="0"/>
-              <a:t>sudo apt-get install </a:t>
-            </a:r>
-            <a:r>
-              <a:rPr lang="en-US" altLang="zh-CN" dirty="0" smtClean="0"/>
-              <a:t>cuda-toolkit-6-5 </a:t>
-            </a:r>
-            <a:endParaRPr lang="en-US" altLang="zh-CN" dirty="0" smtClean="0"/>
+              <a:t>sudo apt-get install cuda-toolkit-6-5 </a:t>
+            </a:r>
           </a:p>
           <a:p>
             <a:r>
@@ -3089,7 +3139,6 @@
               <a:rPr lang="en-US" altLang="zh-CN" dirty="0" smtClean="0"/>
               <a:t> -V </a:t>
             </a:r>
-            <a:endParaRPr lang="en-US" altLang="zh-CN" dirty="0" smtClean="0"/>
           </a:p>
           <a:p>
             <a:endParaRPr lang="en-US" altLang="zh-CN" dirty="0" smtClean="0"/>
@@ -3117,11 +3166,7 @@
           <a:p>
             <a:r>
               <a:rPr lang="en-US" altLang="zh-CN" dirty="0" smtClean="0"/>
-              <a:t>cuda-install-samples-6.5.sh </a:t>
-            </a:r>
-            <a:r>
-              <a:rPr lang="en-US" altLang="zh-CN" dirty="0" smtClean="0"/>
-              <a:t>/home/ubuntu </a:t>
+              <a:t>cuda-install-samples-6.5.sh /home/ubuntu </a:t>
             </a:r>
           </a:p>
           <a:p>
@@ -3136,13 +3181,8 @@
           <a:p>
             <a:r>
               <a:rPr lang="en-US" altLang="zh-CN" dirty="0" smtClean="0"/>
-              <a:t>cd ~/</a:t>
-            </a:r>
-            <a:r>
-              <a:rPr lang="en-US" altLang="zh-CN" dirty="0" smtClean="0"/>
-              <a:t>NVIDIA_CUDA-6.5_Samples/1_Utilities </a:t>
-            </a:r>
-            <a:endParaRPr lang="en-US" altLang="zh-CN" dirty="0" smtClean="0"/>
+              <a:t>cd ~/NVIDIA_CUDA-6.5_Samples/1_Utilities </a:t>
+            </a:r>
           </a:p>
           <a:p>
             <a:r>
@@ -3273,7 +3313,6 @@
               <a:rPr lang="en-US" altLang="zh-CN" dirty="0" smtClean="0"/>
               <a:t>Samples</a:t>
             </a:r>
-            <a:endParaRPr lang="en-US" altLang="zh-CN" dirty="0" smtClean="0"/>
           </a:p>
           <a:p>
             <a:pPr marL="0" indent="0">
@@ -3288,11 +3327,7 @@
           <a:p>
             <a:r>
               <a:rPr lang="en-US" altLang="zh-CN" dirty="0" smtClean="0"/>
-              <a:t>cuda-install-samples-6.5.sh </a:t>
-            </a:r>
-            <a:r>
-              <a:rPr lang="en-US" altLang="zh-CN" dirty="0" smtClean="0"/>
-              <a:t>/home/ubuntu </a:t>
+              <a:t>cuda-install-samples-6.5.sh /home/ubuntu </a:t>
             </a:r>
           </a:p>
           <a:p>
@@ -3307,11 +3342,7 @@
           <a:p>
             <a:r>
               <a:rPr lang="en-US" altLang="zh-CN" dirty="0" smtClean="0"/>
-              <a:t>cd ~/</a:t>
-            </a:r>
-            <a:r>
-              <a:rPr lang="en-US" altLang="zh-CN" dirty="0" smtClean="0"/>
-              <a:t>NVIDIA_CUDA-6.5_Samples/1_Utilities/</a:t>
+              <a:t>cd ~/NVIDIA_CUDA-6.5_Samples/1_Utilities/</a:t>
             </a:r>
             <a:r>
               <a:rPr lang="en-US" altLang="zh-CN" dirty="0" err="1" smtClean="0"/>
@@ -5530,7 +5561,6 @@
               <a:rPr lang="en-US" altLang="zh-CN" sz="3200" dirty="0" smtClean="0"/>
               <a:t> </a:t>
             </a:r>
-            <a:endParaRPr lang="en-US" altLang="zh-CN" sz="3200" dirty="0" smtClean="0"/>
           </a:p>
           <a:p>
             <a:pPr lvl="1"/>
@@ -6928,13 +6958,8 @@
             </a:r>
             <a:r>
               <a:rPr lang="en-US" altLang="zh-CN" sz="3200" dirty="0" smtClean="0"/>
-              <a:t>DEMO</a:t>
-            </a:r>
-            <a:r>
-              <a:rPr lang="en-US" altLang="zh-CN" sz="3200" dirty="0" smtClean="0"/>
-              <a:t> </a:t>
-            </a:r>
-            <a:endParaRPr lang="en-US" altLang="zh-CN" sz="3200" dirty="0" smtClean="0"/>
+              <a:t>DEMO </a:t>
+            </a:r>
           </a:p>
           <a:p>
             <a:pPr lvl="1"/>
@@ -8521,6 +8546,3449 @@
 </file>
 
 <file path=ppt/slides/slide14.xml><?xml version="1.0" encoding="utf-8"?>
+<p:sld xmlns:a="http://schemas.openxmlformats.org/drawingml/2006/main" xmlns:r="http://schemas.openxmlformats.org/officeDocument/2006/relationships" xmlns:p="http://schemas.openxmlformats.org/presentationml/2006/main">
+  <p:cSld>
+    <p:spTree>
+      <p:nvGrpSpPr>
+        <p:cNvPr id="1" name=""/>
+        <p:cNvGrpSpPr/>
+        <p:nvPr/>
+      </p:nvGrpSpPr>
+      <p:grpSpPr>
+        <a:xfrm>
+          <a:off x="0" y="0"/>
+          <a:ext cx="0" cy="0"/>
+          <a:chOff x="0" y="0"/>
+          <a:chExt cx="0" cy="0"/>
+        </a:xfrm>
+      </p:grpSpPr>
+      <p:sp>
+        <p:nvSpPr>
+          <p:cNvPr id="2" name="Title 1"/>
+          <p:cNvSpPr>
+            <a:spLocks noGrp="1"/>
+          </p:cNvSpPr>
+          <p:nvPr>
+            <p:ph type="title"/>
+          </p:nvPr>
+        </p:nvSpPr>
+        <p:spPr>
+          <a:xfrm>
+            <a:off x="884238" y="247650"/>
+            <a:ext cx="9204325" cy="590931"/>
+          </a:xfrm>
+        </p:spPr>
+        <p:txBody>
+          <a:bodyPr/>
+          <a:lstStyle/>
+          <a:p>
+            <a:r>
+              <a:rPr lang="en-US" altLang="zh-CN" dirty="0" err="1" smtClean="0"/>
+              <a:t>OpenCV</a:t>
+            </a:r>
+            <a:r>
+              <a:rPr lang="zh-CN" altLang="en-US" dirty="0" smtClean="0"/>
+              <a:t>编译测试</a:t>
+            </a:r>
+            <a:endParaRPr lang="en-US" dirty="0"/>
+          </a:p>
+        </p:txBody>
+      </p:sp>
+      <p:sp>
+        <p:nvSpPr>
+          <p:cNvPr id="5" name="Content Placeholder 2"/>
+          <p:cNvSpPr txBox="1">
+            <a:spLocks/>
+          </p:cNvSpPr>
+          <p:nvPr/>
+        </p:nvSpPr>
+        <p:spPr>
+          <a:xfrm>
+            <a:off x="1023734" y="1280677"/>
+            <a:ext cx="10036755" cy="4937302"/>
+          </a:xfrm>
+          <a:prstGeom prst="rect">
+            <a:avLst/>
+          </a:prstGeom>
+        </p:spPr>
+        <p:txBody>
+          <a:bodyPr/>
+          <a:lstStyle>
+            <a:lvl1pPr marL="342900" indent="-342900" algn="l" rtl="0" fontAlgn="base">
+              <a:spcBef>
+                <a:spcPct val="20000"/>
+              </a:spcBef>
+              <a:spcAft>
+                <a:spcPct val="0"/>
+              </a:spcAft>
+              <a:buSzPct val="100000"/>
+              <a:buBlip>
+                <a:blip r:embed="rId3"/>
+              </a:buBlip>
+              <a:defRPr sz="2400" b="0">
+                <a:solidFill>
+                  <a:schemeClr val="tx1"/>
+                </a:solidFill>
+                <a:latin typeface="Trebuchet MS" pitchFamily="34" charset="0"/>
+                <a:ea typeface="+mn-ea"/>
+                <a:cs typeface="+mn-cs"/>
+              </a:defRPr>
+            </a:lvl1pPr>
+            <a:lvl2pPr marL="914400" indent="-342900" algn="l" rtl="0" fontAlgn="base">
+              <a:spcBef>
+                <a:spcPct val="20000"/>
+              </a:spcBef>
+              <a:spcAft>
+                <a:spcPct val="0"/>
+              </a:spcAft>
+              <a:buSzPct val="100000"/>
+              <a:buBlip>
+                <a:blip r:embed="rId3"/>
+              </a:buBlip>
+              <a:defRPr sz="2000" b="0">
+                <a:solidFill>
+                  <a:schemeClr val="tx1"/>
+                </a:solidFill>
+                <a:latin typeface="Trebuchet MS" pitchFamily="34" charset="0"/>
+              </a:defRPr>
+            </a:lvl2pPr>
+            <a:lvl3pPr marL="1371600" indent="-282575" algn="l" rtl="0" fontAlgn="base">
+              <a:spcBef>
+                <a:spcPct val="20000"/>
+              </a:spcBef>
+              <a:spcAft>
+                <a:spcPct val="0"/>
+              </a:spcAft>
+              <a:buSzPct val="100000"/>
+              <a:buBlip>
+                <a:blip r:embed="rId3"/>
+              </a:buBlip>
+              <a:defRPr sz="1800" b="0">
+                <a:solidFill>
+                  <a:schemeClr val="tx1"/>
+                </a:solidFill>
+                <a:latin typeface="Trebuchet MS" pitchFamily="34" charset="0"/>
+              </a:defRPr>
+            </a:lvl3pPr>
+            <a:lvl4pPr marL="1774825" indent="-228600" algn="l" rtl="0" fontAlgn="base">
+              <a:spcBef>
+                <a:spcPct val="20000"/>
+              </a:spcBef>
+              <a:spcAft>
+                <a:spcPct val="0"/>
+              </a:spcAft>
+              <a:buChar char="–"/>
+              <a:defRPr sz="2000">
+                <a:solidFill>
+                  <a:schemeClr val="bg1"/>
+                </a:solidFill>
+                <a:latin typeface="+mn-lt"/>
+              </a:defRPr>
+            </a:lvl4pPr>
+            <a:lvl5pPr marL="2117725" indent="-228600" algn="l" rtl="0" fontAlgn="base">
+              <a:spcBef>
+                <a:spcPct val="20000"/>
+              </a:spcBef>
+              <a:spcAft>
+                <a:spcPct val="0"/>
+              </a:spcAft>
+              <a:buChar char="»"/>
+              <a:defRPr sz="2000">
+                <a:solidFill>
+                  <a:schemeClr val="bg1"/>
+                </a:solidFill>
+                <a:latin typeface="+mn-lt"/>
+              </a:defRPr>
+            </a:lvl5pPr>
+            <a:lvl6pPr marL="2574925" indent="-228600" algn="l" rtl="0" eaLnBrk="1" fontAlgn="base" hangingPunct="1">
+              <a:spcBef>
+                <a:spcPct val="20000"/>
+              </a:spcBef>
+              <a:spcAft>
+                <a:spcPct val="0"/>
+              </a:spcAft>
+              <a:buChar char="»"/>
+              <a:defRPr sz="2000">
+                <a:solidFill>
+                  <a:schemeClr val="bg1"/>
+                </a:solidFill>
+                <a:latin typeface="+mn-lt"/>
+              </a:defRPr>
+            </a:lvl6pPr>
+            <a:lvl7pPr marL="3032125" indent="-228600" algn="l" rtl="0" eaLnBrk="1" fontAlgn="base" hangingPunct="1">
+              <a:spcBef>
+                <a:spcPct val="20000"/>
+              </a:spcBef>
+              <a:spcAft>
+                <a:spcPct val="0"/>
+              </a:spcAft>
+              <a:buChar char="»"/>
+              <a:defRPr sz="2000">
+                <a:solidFill>
+                  <a:schemeClr val="bg1"/>
+                </a:solidFill>
+                <a:latin typeface="+mn-lt"/>
+              </a:defRPr>
+            </a:lvl7pPr>
+            <a:lvl8pPr marL="3489325" indent="-228600" algn="l" rtl="0" eaLnBrk="1" fontAlgn="base" hangingPunct="1">
+              <a:spcBef>
+                <a:spcPct val="20000"/>
+              </a:spcBef>
+              <a:spcAft>
+                <a:spcPct val="0"/>
+              </a:spcAft>
+              <a:buChar char="»"/>
+              <a:defRPr sz="2000">
+                <a:solidFill>
+                  <a:schemeClr val="bg1"/>
+                </a:solidFill>
+                <a:latin typeface="+mn-lt"/>
+              </a:defRPr>
+            </a:lvl8pPr>
+            <a:lvl9pPr marL="3946525" indent="-228600" algn="l" rtl="0" eaLnBrk="1" fontAlgn="base" hangingPunct="1">
+              <a:spcBef>
+                <a:spcPct val="20000"/>
+              </a:spcBef>
+              <a:spcAft>
+                <a:spcPct val="0"/>
+              </a:spcAft>
+              <a:buChar char="»"/>
+              <a:defRPr sz="2000">
+                <a:solidFill>
+                  <a:schemeClr val="bg1"/>
+                </a:solidFill>
+                <a:latin typeface="+mn-lt"/>
+              </a:defRPr>
+            </a:lvl9pPr>
+          </a:lstStyle>
+          <a:p>
+            <a:pPr marL="0" indent="0">
+              <a:buNone/>
+            </a:pPr>
+            <a:r>
+              <a:rPr lang="en-US" sz="2000" dirty="0" smtClean="0"/>
+              <a:t>Portable, open API</a:t>
+            </a:r>
+          </a:p>
+          <a:p>
+            <a:pPr marL="0" indent="0">
+              <a:buNone/>
+            </a:pPr>
+            <a:r>
+              <a:rPr lang="en-US" sz="2000" dirty="0" smtClean="0"/>
+              <a:t>900+ functions </a:t>
+            </a:r>
+          </a:p>
+          <a:p>
+            <a:pPr marL="0" indent="0">
+              <a:buNone/>
+            </a:pPr>
+            <a:r>
+              <a:rPr lang="en-US" sz="2000" dirty="0" smtClean="0"/>
+              <a:t>OpenCV4Tegra - Accelerated CUDA+NEON+GLSL+TBB multithreading</a:t>
+            </a:r>
+          </a:p>
+          <a:p>
+            <a:endParaRPr lang="en-US" dirty="0"/>
+          </a:p>
+        </p:txBody>
+      </p:sp>
+      <p:grpSp>
+        <p:nvGrpSpPr>
+          <p:cNvPr id="6" name="Group 5"/>
+          <p:cNvGrpSpPr/>
+          <p:nvPr/>
+        </p:nvGrpSpPr>
+        <p:grpSpPr>
+          <a:xfrm>
+            <a:off x="850078" y="2685051"/>
+            <a:ext cx="9561670" cy="3052800"/>
+            <a:chOff x="1098728" y="1292499"/>
+            <a:chExt cx="9614629" cy="4123011"/>
+          </a:xfrm>
+        </p:grpSpPr>
+        <p:sp>
+          <p:nvSpPr>
+            <p:cNvPr id="7" name="Content Placeholder 2"/>
+            <p:cNvSpPr txBox="1">
+              <a:spLocks/>
+            </p:cNvSpPr>
+            <p:nvPr/>
+          </p:nvSpPr>
+          <p:spPr bwMode="auto">
+            <a:xfrm>
+              <a:off x="1121118" y="2973588"/>
+              <a:ext cx="1828224" cy="552154"/>
+            </a:xfrm>
+            <a:prstGeom prst="rect">
+              <a:avLst/>
+            </a:prstGeom>
+            <a:noFill/>
+            <a:ln>
+              <a:noFill/>
+            </a:ln>
+            <a:extLst>
+              <a:ext uri="{909E8E84-426E-40DD-AFC4-6F175D3DCCD1}">
+                <a14:hiddenFill xmlns:a14="http://schemas.microsoft.com/office/drawing/2010/main">
+                  <a:solidFill>
+                    <a:srgbClr val="FFFFFF"/>
+                  </a:solidFill>
+                </a14:hiddenFill>
+              </a:ext>
+              <a:ext uri="{91240B29-F687-4F45-9708-019B960494DF}">
+                <a14:hiddenLine xmlns:a14="http://schemas.microsoft.com/office/drawing/2010/main" w="9525">
+                  <a:solidFill>
+                    <a:srgbClr val="000000"/>
+                  </a:solidFill>
+                  <a:miter lim="800000"/>
+                  <a:headEnd/>
+                  <a:tailEnd/>
+                </a14:hiddenLine>
+              </a:ext>
+            </a:extLst>
+          </p:spPr>
+          <p:txBody>
+            <a:bodyPr vert="horz" wrap="square" lIns="91440" tIns="45720" rIns="91440" bIns="45720" numCol="1" anchor="t" anchorCtr="0" compatLnSpc="1">
+              <a:prstTxWarp prst="textNoShape">
+                <a:avLst/>
+              </a:prstTxWarp>
+            </a:bodyPr>
+            <a:lstStyle>
+              <a:lvl1pPr marL="342900" indent="-342900" algn="l" rtl="0" fontAlgn="base">
+                <a:spcBef>
+                  <a:spcPct val="20000"/>
+                </a:spcBef>
+                <a:spcAft>
+                  <a:spcPct val="0"/>
+                </a:spcAft>
+                <a:buSzPct val="100000"/>
+                <a:buFontTx/>
+                <a:buBlip>
+                  <a:blip r:embed="rId3"/>
+                </a:buBlip>
+                <a:defRPr sz="2400" b="1">
+                  <a:solidFill>
+                    <a:schemeClr val="tx1"/>
+                  </a:solidFill>
+                  <a:latin typeface="Futura Medium"/>
+                  <a:ea typeface="+mn-ea"/>
+                  <a:cs typeface="+mn-cs"/>
+                </a:defRPr>
+              </a:lvl1pPr>
+              <a:lvl2pPr marL="914400" indent="-342900" algn="l" rtl="0" fontAlgn="base">
+                <a:spcBef>
+                  <a:spcPct val="20000"/>
+                </a:spcBef>
+                <a:spcAft>
+                  <a:spcPct val="0"/>
+                </a:spcAft>
+                <a:buSzPct val="100000"/>
+                <a:buFontTx/>
+                <a:buBlip>
+                  <a:blip r:embed="rId3"/>
+                </a:buBlip>
+                <a:defRPr sz="2000" b="1">
+                  <a:solidFill>
+                    <a:schemeClr val="tx1"/>
+                  </a:solidFill>
+                  <a:latin typeface="Futura Medium"/>
+                </a:defRPr>
+              </a:lvl2pPr>
+              <a:lvl3pPr marL="1371600" indent="-282575" algn="l" rtl="0" fontAlgn="base">
+                <a:spcBef>
+                  <a:spcPct val="20000"/>
+                </a:spcBef>
+                <a:spcAft>
+                  <a:spcPct val="0"/>
+                </a:spcAft>
+                <a:buSzPct val="100000"/>
+                <a:buFontTx/>
+                <a:buBlip>
+                  <a:blip r:embed="rId3"/>
+                </a:buBlip>
+                <a:defRPr sz="1800" b="1">
+                  <a:solidFill>
+                    <a:schemeClr val="tx1"/>
+                  </a:solidFill>
+                  <a:latin typeface="Futura Medium"/>
+                </a:defRPr>
+              </a:lvl3pPr>
+              <a:lvl4pPr marL="1774825" indent="-228600" algn="l" rtl="0" fontAlgn="base">
+                <a:spcBef>
+                  <a:spcPct val="20000"/>
+                </a:spcBef>
+                <a:spcAft>
+                  <a:spcPct val="0"/>
+                </a:spcAft>
+                <a:buChar char="–"/>
+                <a:defRPr sz="2000">
+                  <a:solidFill>
+                    <a:schemeClr val="bg1"/>
+                  </a:solidFill>
+                  <a:latin typeface="Futura Medium"/>
+                </a:defRPr>
+              </a:lvl4pPr>
+              <a:lvl5pPr marL="2117725" indent="-228600" algn="l" rtl="0" fontAlgn="base">
+                <a:spcBef>
+                  <a:spcPct val="20000"/>
+                </a:spcBef>
+                <a:spcAft>
+                  <a:spcPct val="0"/>
+                </a:spcAft>
+                <a:buChar char="»"/>
+                <a:defRPr sz="2000">
+                  <a:solidFill>
+                    <a:schemeClr val="bg1"/>
+                  </a:solidFill>
+                  <a:latin typeface="Futura Medium"/>
+                </a:defRPr>
+              </a:lvl5pPr>
+              <a:lvl6pPr marL="2574925" indent="-228600" algn="l" rtl="0" eaLnBrk="1" fontAlgn="base" hangingPunct="1">
+                <a:spcBef>
+                  <a:spcPct val="20000"/>
+                </a:spcBef>
+                <a:spcAft>
+                  <a:spcPct val="0"/>
+                </a:spcAft>
+                <a:buChar char="»"/>
+                <a:defRPr sz="2000">
+                  <a:solidFill>
+                    <a:schemeClr val="bg1"/>
+                  </a:solidFill>
+                  <a:latin typeface="+mn-lt"/>
+                </a:defRPr>
+              </a:lvl6pPr>
+              <a:lvl7pPr marL="3032125" indent="-228600" algn="l" rtl="0" eaLnBrk="1" fontAlgn="base" hangingPunct="1">
+                <a:spcBef>
+                  <a:spcPct val="20000"/>
+                </a:spcBef>
+                <a:spcAft>
+                  <a:spcPct val="0"/>
+                </a:spcAft>
+                <a:buChar char="»"/>
+                <a:defRPr sz="2000">
+                  <a:solidFill>
+                    <a:schemeClr val="bg1"/>
+                  </a:solidFill>
+                  <a:latin typeface="+mn-lt"/>
+                </a:defRPr>
+              </a:lvl7pPr>
+              <a:lvl8pPr marL="3489325" indent="-228600" algn="l" rtl="0" eaLnBrk="1" fontAlgn="base" hangingPunct="1">
+                <a:spcBef>
+                  <a:spcPct val="20000"/>
+                </a:spcBef>
+                <a:spcAft>
+                  <a:spcPct val="0"/>
+                </a:spcAft>
+                <a:buChar char="»"/>
+                <a:defRPr sz="2000">
+                  <a:solidFill>
+                    <a:schemeClr val="bg1"/>
+                  </a:solidFill>
+                  <a:latin typeface="+mn-lt"/>
+                </a:defRPr>
+              </a:lvl8pPr>
+              <a:lvl9pPr marL="3946525" indent="-228600" algn="l" rtl="0" eaLnBrk="1" fontAlgn="base" hangingPunct="1">
+                <a:spcBef>
+                  <a:spcPct val="20000"/>
+                </a:spcBef>
+                <a:spcAft>
+                  <a:spcPct val="0"/>
+                </a:spcAft>
+                <a:buChar char="»"/>
+                <a:defRPr sz="2000">
+                  <a:solidFill>
+                    <a:schemeClr val="bg1"/>
+                  </a:solidFill>
+                  <a:latin typeface="+mn-lt"/>
+                </a:defRPr>
+              </a:lvl9pPr>
+            </a:lstStyle>
+            <a:p>
+              <a:pPr marL="0" indent="0" algn="ctr">
+                <a:buFontTx/>
+                <a:buNone/>
+              </a:pPr>
+              <a:r>
+                <a:rPr lang="en-US" sz="1200" b="0" dirty="0" smtClean="0">
+                  <a:solidFill>
+                    <a:srgbClr val="FF9933"/>
+                  </a:solidFill>
+                  <a:latin typeface="Arial" charset="0"/>
+                  <a:cs typeface="DejaVu Sans" charset="0"/>
+                </a:rPr>
+                <a:t>General Image Processing</a:t>
+              </a:r>
+              <a:endParaRPr lang="en-US" sz="1200" b="0" dirty="0">
+                <a:solidFill>
+                  <a:srgbClr val="FF9933"/>
+                </a:solidFill>
+                <a:latin typeface="Arial" charset="0"/>
+                <a:cs typeface="DejaVu Sans" charset="0"/>
+              </a:endParaRPr>
+            </a:p>
+          </p:txBody>
+        </p:sp>
+        <p:pic>
+          <p:nvPicPr>
+            <p:cNvPr id="8" name="Picture 3"/>
+            <p:cNvPicPr>
+              <a:picLocks noChangeAspect="1" noChangeArrowheads="1"/>
+            </p:cNvPicPr>
+            <p:nvPr/>
+          </p:nvPicPr>
+          <p:blipFill>
+            <a:blip r:embed="rId4" cstate="screen">
+              <a:extLst>
+                <a:ext uri="{28A0092B-C50C-407E-A947-70E740481C1C}">
+                  <a14:useLocalDpi xmlns:a14="http://schemas.microsoft.com/office/drawing/2010/main"/>
+                </a:ext>
+              </a:extLst>
+            </a:blip>
+            <a:srcRect/>
+            <a:stretch>
+              <a:fillRect/>
+            </a:stretch>
+          </p:blipFill>
+          <p:spPr bwMode="auto">
+            <a:xfrm>
+              <a:off x="1402856" y="1764294"/>
+              <a:ext cx="1219968" cy="1209295"/>
+            </a:xfrm>
+            <a:prstGeom prst="rect">
+              <a:avLst/>
+            </a:prstGeom>
+            <a:noFill/>
+            <a:ln>
+              <a:noFill/>
+            </a:ln>
+            <a:extLst>
+              <a:ext uri="{909E8E84-426E-40DD-AFC4-6F175D3DCCD1}">
+                <a14:hiddenFill xmlns:a14="http://schemas.microsoft.com/office/drawing/2010/main">
+                  <a:solidFill>
+                    <a:srgbClr val="FFFFFF"/>
+                  </a:solidFill>
+                </a14:hiddenFill>
+              </a:ext>
+              <a:ext uri="{91240B29-F687-4F45-9708-019B960494DF}">
+                <a14:hiddenLine xmlns:a14="http://schemas.microsoft.com/office/drawing/2010/main" w="9525">
+                  <a:solidFill>
+                    <a:srgbClr val="000000"/>
+                  </a:solidFill>
+                  <a:miter lim="800000"/>
+                  <a:headEnd/>
+                  <a:tailEnd/>
+                </a14:hiddenLine>
+              </a:ext>
+            </a:extLst>
+          </p:spPr>
+        </p:pic>
+        <p:pic>
+          <p:nvPicPr>
+            <p:cNvPr id="9" name="Picture 7"/>
+            <p:cNvPicPr>
+              <a:picLocks noChangeAspect="1" noChangeArrowheads="1"/>
+            </p:cNvPicPr>
+            <p:nvPr/>
+          </p:nvPicPr>
+          <p:blipFill>
+            <a:blip r:embed="rId5">
+              <a:extLst>
+                <a:ext uri="{28A0092B-C50C-407E-A947-70E740481C1C}">
+                  <a14:useLocalDpi xmlns:a14="http://schemas.microsoft.com/office/drawing/2010/main"/>
+                </a:ext>
+              </a:extLst>
+            </a:blip>
+            <a:srcRect/>
+            <a:stretch>
+              <a:fillRect/>
+            </a:stretch>
+          </p:blipFill>
+          <p:spPr bwMode="auto">
+            <a:xfrm>
+              <a:off x="2949341" y="1764294"/>
+              <a:ext cx="1195776" cy="1209295"/>
+            </a:xfrm>
+            <a:prstGeom prst="rect">
+              <a:avLst/>
+            </a:prstGeom>
+            <a:noFill/>
+            <a:ln>
+              <a:noFill/>
+            </a:ln>
+            <a:extLst>
+              <a:ext uri="{909E8E84-426E-40DD-AFC4-6F175D3DCCD1}">
+                <a14:hiddenFill xmlns:a14="http://schemas.microsoft.com/office/drawing/2010/main">
+                  <a:solidFill>
+                    <a:srgbClr val="FFFFFF"/>
+                  </a:solidFill>
+                </a14:hiddenFill>
+              </a:ext>
+              <a:ext uri="{91240B29-F687-4F45-9708-019B960494DF}">
+                <a14:hiddenLine xmlns:a14="http://schemas.microsoft.com/office/drawing/2010/main" w="9525">
+                  <a:solidFill>
+                    <a:srgbClr val="000000"/>
+                  </a:solidFill>
+                  <a:miter lim="800000"/>
+                  <a:headEnd/>
+                  <a:tailEnd/>
+                </a14:hiddenLine>
+              </a:ext>
+            </a:extLst>
+          </p:spPr>
+        </p:pic>
+        <p:pic>
+          <p:nvPicPr>
+            <p:cNvPr id="10" name="Picture 11"/>
+            <p:cNvPicPr>
+              <a:picLocks noChangeAspect="1" noChangeArrowheads="1"/>
+            </p:cNvPicPr>
+            <p:nvPr/>
+          </p:nvPicPr>
+          <p:blipFill>
+            <a:blip r:embed="rId6">
+              <a:extLst>
+                <a:ext uri="{28A0092B-C50C-407E-A947-70E740481C1C}">
+                  <a14:useLocalDpi xmlns:a14="http://schemas.microsoft.com/office/drawing/2010/main"/>
+                </a:ext>
+              </a:extLst>
+            </a:blip>
+            <a:srcRect/>
+            <a:stretch>
+              <a:fillRect/>
+            </a:stretch>
+          </p:blipFill>
+          <p:spPr bwMode="auto">
+            <a:xfrm>
+              <a:off x="2926952" y="3612583"/>
+              <a:ext cx="1219968" cy="1218368"/>
+            </a:xfrm>
+            <a:prstGeom prst="rect">
+              <a:avLst/>
+            </a:prstGeom>
+            <a:noFill/>
+            <a:ln>
+              <a:noFill/>
+            </a:ln>
+            <a:extLst>
+              <a:ext uri="{909E8E84-426E-40DD-AFC4-6F175D3DCCD1}">
+                <a14:hiddenFill xmlns:a14="http://schemas.microsoft.com/office/drawing/2010/main">
+                  <a:solidFill>
+                    <a:srgbClr val="FFFFFF"/>
+                  </a:solidFill>
+                </a14:hiddenFill>
+              </a:ext>
+              <a:ext uri="{91240B29-F687-4F45-9708-019B960494DF}">
+                <a14:hiddenLine xmlns:a14="http://schemas.microsoft.com/office/drawing/2010/main" w="9525">
+                  <a:solidFill>
+                    <a:srgbClr val="000000"/>
+                  </a:solidFill>
+                  <a:miter lim="800000"/>
+                  <a:headEnd/>
+                  <a:tailEnd/>
+                </a14:hiddenLine>
+              </a:ext>
+            </a:extLst>
+          </p:spPr>
+        </p:pic>
+        <p:pic>
+          <p:nvPicPr>
+            <p:cNvPr id="11" name="Picture 2"/>
+            <p:cNvPicPr>
+              <a:picLocks noChangeAspect="1" noChangeArrowheads="1"/>
+            </p:cNvPicPr>
+            <p:nvPr/>
+          </p:nvPicPr>
+          <p:blipFill>
+            <a:blip r:embed="rId7">
+              <a:extLst>
+                <a:ext uri="{28A0092B-C50C-407E-A947-70E740481C1C}">
+                  <a14:useLocalDpi xmlns:a14="http://schemas.microsoft.com/office/drawing/2010/main"/>
+                </a:ext>
+              </a:extLst>
+            </a:blip>
+            <a:srcRect/>
+            <a:stretch>
+              <a:fillRect/>
+            </a:stretch>
+          </p:blipFill>
+          <p:spPr bwMode="auto">
+            <a:xfrm>
+              <a:off x="4451047" y="1764293"/>
+              <a:ext cx="1219969" cy="1209295"/>
+            </a:xfrm>
+            <a:prstGeom prst="rect">
+              <a:avLst/>
+            </a:prstGeom>
+            <a:noFill/>
+            <a:ln>
+              <a:noFill/>
+            </a:ln>
+            <a:extLst>
+              <a:ext uri="{909E8E84-426E-40DD-AFC4-6F175D3DCCD1}">
+                <a14:hiddenFill xmlns:a14="http://schemas.microsoft.com/office/drawing/2010/main">
+                  <a:solidFill>
+                    <a:srgbClr val="FFFFFF"/>
+                  </a:solidFill>
+                </a14:hiddenFill>
+              </a:ext>
+              <a:ext uri="{91240B29-F687-4F45-9708-019B960494DF}">
+                <a14:hiddenLine xmlns:a14="http://schemas.microsoft.com/office/drawing/2010/main" w="9525">
+                  <a:solidFill>
+                    <a:srgbClr val="000000"/>
+                  </a:solidFill>
+                  <a:miter lim="800000"/>
+                  <a:headEnd/>
+                  <a:tailEnd/>
+                </a14:hiddenLine>
+              </a:ext>
+            </a:extLst>
+          </p:spPr>
+        </p:pic>
+        <p:pic>
+          <p:nvPicPr>
+            <p:cNvPr id="12" name="Picture 4"/>
+            <p:cNvPicPr>
+              <a:picLocks noChangeAspect="1" noChangeArrowheads="1"/>
+            </p:cNvPicPr>
+            <p:nvPr/>
+          </p:nvPicPr>
+          <p:blipFill>
+            <a:blip r:embed="rId8">
+              <a:extLst>
+                <a:ext uri="{28A0092B-C50C-407E-A947-70E740481C1C}">
+                  <a14:useLocalDpi xmlns:a14="http://schemas.microsoft.com/office/drawing/2010/main"/>
+                </a:ext>
+              </a:extLst>
+            </a:blip>
+            <a:srcRect/>
+            <a:stretch>
+              <a:fillRect/>
+            </a:stretch>
+          </p:blipFill>
+          <p:spPr bwMode="auto">
+            <a:xfrm>
+              <a:off x="1402856" y="3621656"/>
+              <a:ext cx="1219968" cy="1209294"/>
+            </a:xfrm>
+            <a:prstGeom prst="rect">
+              <a:avLst/>
+            </a:prstGeom>
+            <a:noFill/>
+            <a:ln>
+              <a:noFill/>
+            </a:ln>
+            <a:extLst>
+              <a:ext uri="{909E8E84-426E-40DD-AFC4-6F175D3DCCD1}">
+                <a14:hiddenFill xmlns:a14="http://schemas.microsoft.com/office/drawing/2010/main">
+                  <a:solidFill>
+                    <a:srgbClr val="FFFFFF"/>
+                  </a:solidFill>
+                </a14:hiddenFill>
+              </a:ext>
+              <a:ext uri="{91240B29-F687-4F45-9708-019B960494DF}">
+                <a14:hiddenLine xmlns:a14="http://schemas.microsoft.com/office/drawing/2010/main" w="9525">
+                  <a:solidFill>
+                    <a:srgbClr val="000000"/>
+                  </a:solidFill>
+                  <a:miter lim="800000"/>
+                  <a:headEnd/>
+                  <a:tailEnd/>
+                </a14:hiddenLine>
+              </a:ext>
+            </a:extLst>
+          </p:spPr>
+        </p:pic>
+        <p:sp>
+          <p:nvSpPr>
+            <p:cNvPr id="13" name="Content Placeholder 2"/>
+            <p:cNvSpPr txBox="1">
+              <a:spLocks/>
+            </p:cNvSpPr>
+            <p:nvPr/>
+          </p:nvSpPr>
+          <p:spPr bwMode="auto">
+            <a:xfrm>
+              <a:off x="2645214" y="2973588"/>
+              <a:ext cx="1804032" cy="552154"/>
+            </a:xfrm>
+            <a:prstGeom prst="rect">
+              <a:avLst/>
+            </a:prstGeom>
+            <a:noFill/>
+            <a:ln>
+              <a:noFill/>
+            </a:ln>
+            <a:extLst>
+              <a:ext uri="{909E8E84-426E-40DD-AFC4-6F175D3DCCD1}">
+                <a14:hiddenFill xmlns:a14="http://schemas.microsoft.com/office/drawing/2010/main">
+                  <a:solidFill>
+                    <a:srgbClr val="FFFFFF"/>
+                  </a:solidFill>
+                </a14:hiddenFill>
+              </a:ext>
+              <a:ext uri="{91240B29-F687-4F45-9708-019B960494DF}">
+                <a14:hiddenLine xmlns:a14="http://schemas.microsoft.com/office/drawing/2010/main" w="9525">
+                  <a:solidFill>
+                    <a:srgbClr val="000000"/>
+                  </a:solidFill>
+                  <a:miter lim="800000"/>
+                  <a:headEnd/>
+                  <a:tailEnd/>
+                </a14:hiddenLine>
+              </a:ext>
+            </a:extLst>
+          </p:spPr>
+          <p:txBody>
+            <a:bodyPr/>
+            <a:lstStyle>
+              <a:lvl1pPr eaLnBrk="0" hangingPunct="0">
+                <a:defRPr sz="2400">
+                  <a:solidFill>
+                    <a:schemeClr val="tx1"/>
+                  </a:solidFill>
+                  <a:latin typeface="Arial" charset="0"/>
+                  <a:ea typeface="ＭＳ Ｐゴシック" charset="0"/>
+                  <a:cs typeface="DejaVu Sans" charset="0"/>
+                </a:defRPr>
+              </a:lvl1pPr>
+              <a:lvl2pPr marL="37931725" indent="-37474525" eaLnBrk="0" hangingPunct="0">
+                <a:defRPr sz="2400">
+                  <a:solidFill>
+                    <a:schemeClr val="tx1"/>
+                  </a:solidFill>
+                  <a:latin typeface="Arial" charset="0"/>
+                  <a:ea typeface="DejaVu Sans" charset="0"/>
+                  <a:cs typeface="DejaVu Sans" charset="0"/>
+                </a:defRPr>
+              </a:lvl2pPr>
+              <a:lvl3pPr eaLnBrk="0" hangingPunct="0">
+                <a:defRPr sz="2400">
+                  <a:solidFill>
+                    <a:schemeClr val="tx1"/>
+                  </a:solidFill>
+                  <a:latin typeface="Arial" charset="0"/>
+                  <a:ea typeface="DejaVu Sans" charset="0"/>
+                  <a:cs typeface="DejaVu Sans" charset="0"/>
+                </a:defRPr>
+              </a:lvl3pPr>
+              <a:lvl4pPr eaLnBrk="0" hangingPunct="0">
+                <a:defRPr sz="2400">
+                  <a:solidFill>
+                    <a:schemeClr val="tx1"/>
+                  </a:solidFill>
+                  <a:latin typeface="Arial" charset="0"/>
+                  <a:ea typeface="DejaVu Sans" charset="0"/>
+                  <a:cs typeface="DejaVu Sans" charset="0"/>
+                </a:defRPr>
+              </a:lvl4pPr>
+              <a:lvl5pPr eaLnBrk="0" hangingPunct="0">
+                <a:defRPr sz="2400">
+                  <a:solidFill>
+                    <a:schemeClr val="tx1"/>
+                  </a:solidFill>
+                  <a:latin typeface="Arial" charset="0"/>
+                  <a:ea typeface="DejaVu Sans" charset="0"/>
+                  <a:cs typeface="DejaVu Sans" charset="0"/>
+                </a:defRPr>
+              </a:lvl5pPr>
+              <a:lvl6pPr marL="457200" eaLnBrk="0" fontAlgn="base" hangingPunct="0">
+                <a:spcBef>
+                  <a:spcPct val="0"/>
+                </a:spcBef>
+                <a:spcAft>
+                  <a:spcPct val="0"/>
+                </a:spcAft>
+                <a:defRPr sz="2400">
+                  <a:solidFill>
+                    <a:schemeClr val="tx1"/>
+                  </a:solidFill>
+                  <a:latin typeface="Arial" charset="0"/>
+                  <a:ea typeface="DejaVu Sans" charset="0"/>
+                  <a:cs typeface="DejaVu Sans" charset="0"/>
+                </a:defRPr>
+              </a:lvl6pPr>
+              <a:lvl7pPr marL="914400" eaLnBrk="0" fontAlgn="base" hangingPunct="0">
+                <a:spcBef>
+                  <a:spcPct val="0"/>
+                </a:spcBef>
+                <a:spcAft>
+                  <a:spcPct val="0"/>
+                </a:spcAft>
+                <a:defRPr sz="2400">
+                  <a:solidFill>
+                    <a:schemeClr val="tx1"/>
+                  </a:solidFill>
+                  <a:latin typeface="Arial" charset="0"/>
+                  <a:ea typeface="DejaVu Sans" charset="0"/>
+                  <a:cs typeface="DejaVu Sans" charset="0"/>
+                </a:defRPr>
+              </a:lvl7pPr>
+              <a:lvl8pPr marL="1371600" eaLnBrk="0" fontAlgn="base" hangingPunct="0">
+                <a:spcBef>
+                  <a:spcPct val="0"/>
+                </a:spcBef>
+                <a:spcAft>
+                  <a:spcPct val="0"/>
+                </a:spcAft>
+                <a:defRPr sz="2400">
+                  <a:solidFill>
+                    <a:schemeClr val="tx1"/>
+                  </a:solidFill>
+                  <a:latin typeface="Arial" charset="0"/>
+                  <a:ea typeface="DejaVu Sans" charset="0"/>
+                  <a:cs typeface="DejaVu Sans" charset="0"/>
+                </a:defRPr>
+              </a:lvl8pPr>
+              <a:lvl9pPr marL="1828800" eaLnBrk="0" fontAlgn="base" hangingPunct="0">
+                <a:spcBef>
+                  <a:spcPct val="0"/>
+                </a:spcBef>
+                <a:spcAft>
+                  <a:spcPct val="0"/>
+                </a:spcAft>
+                <a:defRPr sz="2400">
+                  <a:solidFill>
+                    <a:schemeClr val="tx1"/>
+                  </a:solidFill>
+                  <a:latin typeface="Arial" charset="0"/>
+                  <a:ea typeface="DejaVu Sans" charset="0"/>
+                  <a:cs typeface="DejaVu Sans" charset="0"/>
+                </a:defRPr>
+              </a:lvl9pPr>
+            </a:lstStyle>
+            <a:p>
+              <a:pPr algn="ctr" defTabSz="914400" eaLnBrk="1" hangingPunct="1">
+                <a:buFont typeface="Arial" charset="0"/>
+                <a:buNone/>
+              </a:pPr>
+              <a:r>
+                <a:rPr lang="en-US" sz="1200" dirty="0">
+                  <a:solidFill>
+                    <a:srgbClr val="FF9933"/>
+                  </a:solidFill>
+                </a:rPr>
+                <a:t>Segmentation</a:t>
+              </a:r>
+            </a:p>
+          </p:txBody>
+        </p:sp>
+        <p:sp>
+          <p:nvSpPr>
+            <p:cNvPr id="14" name="Content Placeholder 2"/>
+            <p:cNvSpPr txBox="1">
+              <a:spLocks/>
+            </p:cNvSpPr>
+            <p:nvPr/>
+          </p:nvSpPr>
+          <p:spPr bwMode="auto">
+            <a:xfrm>
+              <a:off x="4145118" y="2973588"/>
+              <a:ext cx="1828224" cy="638995"/>
+            </a:xfrm>
+            <a:prstGeom prst="rect">
+              <a:avLst/>
+            </a:prstGeom>
+            <a:noFill/>
+            <a:ln>
+              <a:noFill/>
+            </a:ln>
+            <a:extLst>
+              <a:ext uri="{909E8E84-426E-40DD-AFC4-6F175D3DCCD1}">
+                <a14:hiddenFill xmlns:a14="http://schemas.microsoft.com/office/drawing/2010/main">
+                  <a:solidFill>
+                    <a:srgbClr val="FFFFFF"/>
+                  </a:solidFill>
+                </a14:hiddenFill>
+              </a:ext>
+              <a:ext uri="{91240B29-F687-4F45-9708-019B960494DF}">
+                <a14:hiddenLine xmlns:a14="http://schemas.microsoft.com/office/drawing/2010/main" w="9525">
+                  <a:solidFill>
+                    <a:srgbClr val="000000"/>
+                  </a:solidFill>
+                  <a:miter lim="800000"/>
+                  <a:headEnd/>
+                  <a:tailEnd/>
+                </a14:hiddenLine>
+              </a:ext>
+            </a:extLst>
+          </p:spPr>
+          <p:txBody>
+            <a:bodyPr/>
+            <a:lstStyle>
+              <a:lvl1pPr eaLnBrk="0" hangingPunct="0">
+                <a:defRPr sz="2400">
+                  <a:solidFill>
+                    <a:schemeClr val="tx1"/>
+                  </a:solidFill>
+                  <a:latin typeface="Arial" charset="0"/>
+                  <a:ea typeface="ＭＳ Ｐゴシック" charset="0"/>
+                  <a:cs typeface="DejaVu Sans" charset="0"/>
+                </a:defRPr>
+              </a:lvl1pPr>
+              <a:lvl2pPr marL="37931725" indent="-37474525" eaLnBrk="0" hangingPunct="0">
+                <a:defRPr sz="2400">
+                  <a:solidFill>
+                    <a:schemeClr val="tx1"/>
+                  </a:solidFill>
+                  <a:latin typeface="Arial" charset="0"/>
+                  <a:ea typeface="DejaVu Sans" charset="0"/>
+                  <a:cs typeface="DejaVu Sans" charset="0"/>
+                </a:defRPr>
+              </a:lvl2pPr>
+              <a:lvl3pPr eaLnBrk="0" hangingPunct="0">
+                <a:defRPr sz="2400">
+                  <a:solidFill>
+                    <a:schemeClr val="tx1"/>
+                  </a:solidFill>
+                  <a:latin typeface="Arial" charset="0"/>
+                  <a:ea typeface="DejaVu Sans" charset="0"/>
+                  <a:cs typeface="DejaVu Sans" charset="0"/>
+                </a:defRPr>
+              </a:lvl3pPr>
+              <a:lvl4pPr eaLnBrk="0" hangingPunct="0">
+                <a:defRPr sz="2400">
+                  <a:solidFill>
+                    <a:schemeClr val="tx1"/>
+                  </a:solidFill>
+                  <a:latin typeface="Arial" charset="0"/>
+                  <a:ea typeface="DejaVu Sans" charset="0"/>
+                  <a:cs typeface="DejaVu Sans" charset="0"/>
+                </a:defRPr>
+              </a:lvl4pPr>
+              <a:lvl5pPr eaLnBrk="0" hangingPunct="0">
+                <a:defRPr sz="2400">
+                  <a:solidFill>
+                    <a:schemeClr val="tx1"/>
+                  </a:solidFill>
+                  <a:latin typeface="Arial" charset="0"/>
+                  <a:ea typeface="DejaVu Sans" charset="0"/>
+                  <a:cs typeface="DejaVu Sans" charset="0"/>
+                </a:defRPr>
+              </a:lvl5pPr>
+              <a:lvl6pPr marL="457200" eaLnBrk="0" fontAlgn="base" hangingPunct="0">
+                <a:spcBef>
+                  <a:spcPct val="0"/>
+                </a:spcBef>
+                <a:spcAft>
+                  <a:spcPct val="0"/>
+                </a:spcAft>
+                <a:defRPr sz="2400">
+                  <a:solidFill>
+                    <a:schemeClr val="tx1"/>
+                  </a:solidFill>
+                  <a:latin typeface="Arial" charset="0"/>
+                  <a:ea typeface="DejaVu Sans" charset="0"/>
+                  <a:cs typeface="DejaVu Sans" charset="0"/>
+                </a:defRPr>
+              </a:lvl6pPr>
+              <a:lvl7pPr marL="914400" eaLnBrk="0" fontAlgn="base" hangingPunct="0">
+                <a:spcBef>
+                  <a:spcPct val="0"/>
+                </a:spcBef>
+                <a:spcAft>
+                  <a:spcPct val="0"/>
+                </a:spcAft>
+                <a:defRPr sz="2400">
+                  <a:solidFill>
+                    <a:schemeClr val="tx1"/>
+                  </a:solidFill>
+                  <a:latin typeface="Arial" charset="0"/>
+                  <a:ea typeface="DejaVu Sans" charset="0"/>
+                  <a:cs typeface="DejaVu Sans" charset="0"/>
+                </a:defRPr>
+              </a:lvl7pPr>
+              <a:lvl8pPr marL="1371600" eaLnBrk="0" fontAlgn="base" hangingPunct="0">
+                <a:spcBef>
+                  <a:spcPct val="0"/>
+                </a:spcBef>
+                <a:spcAft>
+                  <a:spcPct val="0"/>
+                </a:spcAft>
+                <a:defRPr sz="2400">
+                  <a:solidFill>
+                    <a:schemeClr val="tx1"/>
+                  </a:solidFill>
+                  <a:latin typeface="Arial" charset="0"/>
+                  <a:ea typeface="DejaVu Sans" charset="0"/>
+                  <a:cs typeface="DejaVu Sans" charset="0"/>
+                </a:defRPr>
+              </a:lvl8pPr>
+              <a:lvl9pPr marL="1828800" eaLnBrk="0" fontAlgn="base" hangingPunct="0">
+                <a:spcBef>
+                  <a:spcPct val="0"/>
+                </a:spcBef>
+                <a:spcAft>
+                  <a:spcPct val="0"/>
+                </a:spcAft>
+                <a:defRPr sz="2400">
+                  <a:solidFill>
+                    <a:schemeClr val="tx1"/>
+                  </a:solidFill>
+                  <a:latin typeface="Arial" charset="0"/>
+                  <a:ea typeface="DejaVu Sans" charset="0"/>
+                  <a:cs typeface="DejaVu Sans" charset="0"/>
+                </a:defRPr>
+              </a:lvl9pPr>
+            </a:lstStyle>
+            <a:p>
+              <a:pPr algn="ctr" defTabSz="914400" eaLnBrk="1" hangingPunct="1">
+                <a:buFont typeface="Arial" charset="0"/>
+                <a:buNone/>
+              </a:pPr>
+              <a:r>
+                <a:rPr lang="en-US" sz="1200">
+                  <a:solidFill>
+                    <a:srgbClr val="FF9933"/>
+                  </a:solidFill>
+                </a:rPr>
+                <a:t>Machine Learning, Detection</a:t>
+              </a:r>
+            </a:p>
+          </p:txBody>
+        </p:sp>
+        <p:sp>
+          <p:nvSpPr>
+            <p:cNvPr id="15" name="Content Placeholder 2"/>
+            <p:cNvSpPr txBox="1">
+              <a:spLocks/>
+            </p:cNvSpPr>
+            <p:nvPr/>
+          </p:nvSpPr>
+          <p:spPr bwMode="auto">
+            <a:xfrm>
+              <a:off x="1098728" y="4841321"/>
+              <a:ext cx="1828224" cy="552154"/>
+            </a:xfrm>
+            <a:prstGeom prst="rect">
+              <a:avLst/>
+            </a:prstGeom>
+            <a:noFill/>
+            <a:ln>
+              <a:noFill/>
+            </a:ln>
+            <a:extLst>
+              <a:ext uri="{909E8E84-426E-40DD-AFC4-6F175D3DCCD1}">
+                <a14:hiddenFill xmlns:a14="http://schemas.microsoft.com/office/drawing/2010/main">
+                  <a:solidFill>
+                    <a:srgbClr val="FFFFFF"/>
+                  </a:solidFill>
+                </a14:hiddenFill>
+              </a:ext>
+              <a:ext uri="{91240B29-F687-4F45-9708-019B960494DF}">
+                <a14:hiddenLine xmlns:a14="http://schemas.microsoft.com/office/drawing/2010/main" w="9525">
+                  <a:solidFill>
+                    <a:srgbClr val="000000"/>
+                  </a:solidFill>
+                  <a:miter lim="800000"/>
+                  <a:headEnd/>
+                  <a:tailEnd/>
+                </a14:hiddenLine>
+              </a:ext>
+            </a:extLst>
+          </p:spPr>
+          <p:txBody>
+            <a:bodyPr/>
+            <a:lstStyle>
+              <a:lvl1pPr eaLnBrk="0" hangingPunct="0">
+                <a:defRPr sz="2400">
+                  <a:solidFill>
+                    <a:schemeClr val="tx1"/>
+                  </a:solidFill>
+                  <a:latin typeface="Arial" charset="0"/>
+                  <a:ea typeface="ＭＳ Ｐゴシック" charset="0"/>
+                  <a:cs typeface="DejaVu Sans" charset="0"/>
+                </a:defRPr>
+              </a:lvl1pPr>
+              <a:lvl2pPr marL="37931725" indent="-37474525" eaLnBrk="0" hangingPunct="0">
+                <a:defRPr sz="2400">
+                  <a:solidFill>
+                    <a:schemeClr val="tx1"/>
+                  </a:solidFill>
+                  <a:latin typeface="Arial" charset="0"/>
+                  <a:ea typeface="DejaVu Sans" charset="0"/>
+                  <a:cs typeface="DejaVu Sans" charset="0"/>
+                </a:defRPr>
+              </a:lvl2pPr>
+              <a:lvl3pPr eaLnBrk="0" hangingPunct="0">
+                <a:defRPr sz="2400">
+                  <a:solidFill>
+                    <a:schemeClr val="tx1"/>
+                  </a:solidFill>
+                  <a:latin typeface="Arial" charset="0"/>
+                  <a:ea typeface="DejaVu Sans" charset="0"/>
+                  <a:cs typeface="DejaVu Sans" charset="0"/>
+                </a:defRPr>
+              </a:lvl3pPr>
+              <a:lvl4pPr eaLnBrk="0" hangingPunct="0">
+                <a:defRPr sz="2400">
+                  <a:solidFill>
+                    <a:schemeClr val="tx1"/>
+                  </a:solidFill>
+                  <a:latin typeface="Arial" charset="0"/>
+                  <a:ea typeface="DejaVu Sans" charset="0"/>
+                  <a:cs typeface="DejaVu Sans" charset="0"/>
+                </a:defRPr>
+              </a:lvl4pPr>
+              <a:lvl5pPr eaLnBrk="0" hangingPunct="0">
+                <a:defRPr sz="2400">
+                  <a:solidFill>
+                    <a:schemeClr val="tx1"/>
+                  </a:solidFill>
+                  <a:latin typeface="Arial" charset="0"/>
+                  <a:ea typeface="DejaVu Sans" charset="0"/>
+                  <a:cs typeface="DejaVu Sans" charset="0"/>
+                </a:defRPr>
+              </a:lvl5pPr>
+              <a:lvl6pPr marL="457200" eaLnBrk="0" fontAlgn="base" hangingPunct="0">
+                <a:spcBef>
+                  <a:spcPct val="0"/>
+                </a:spcBef>
+                <a:spcAft>
+                  <a:spcPct val="0"/>
+                </a:spcAft>
+                <a:defRPr sz="2400">
+                  <a:solidFill>
+                    <a:schemeClr val="tx1"/>
+                  </a:solidFill>
+                  <a:latin typeface="Arial" charset="0"/>
+                  <a:ea typeface="DejaVu Sans" charset="0"/>
+                  <a:cs typeface="DejaVu Sans" charset="0"/>
+                </a:defRPr>
+              </a:lvl6pPr>
+              <a:lvl7pPr marL="914400" eaLnBrk="0" fontAlgn="base" hangingPunct="0">
+                <a:spcBef>
+                  <a:spcPct val="0"/>
+                </a:spcBef>
+                <a:spcAft>
+                  <a:spcPct val="0"/>
+                </a:spcAft>
+                <a:defRPr sz="2400">
+                  <a:solidFill>
+                    <a:schemeClr val="tx1"/>
+                  </a:solidFill>
+                  <a:latin typeface="Arial" charset="0"/>
+                  <a:ea typeface="DejaVu Sans" charset="0"/>
+                  <a:cs typeface="DejaVu Sans" charset="0"/>
+                </a:defRPr>
+              </a:lvl7pPr>
+              <a:lvl8pPr marL="1371600" eaLnBrk="0" fontAlgn="base" hangingPunct="0">
+                <a:spcBef>
+                  <a:spcPct val="0"/>
+                </a:spcBef>
+                <a:spcAft>
+                  <a:spcPct val="0"/>
+                </a:spcAft>
+                <a:defRPr sz="2400">
+                  <a:solidFill>
+                    <a:schemeClr val="tx1"/>
+                  </a:solidFill>
+                  <a:latin typeface="Arial" charset="0"/>
+                  <a:ea typeface="DejaVu Sans" charset="0"/>
+                  <a:cs typeface="DejaVu Sans" charset="0"/>
+                </a:defRPr>
+              </a:lvl8pPr>
+              <a:lvl9pPr marL="1828800" eaLnBrk="0" fontAlgn="base" hangingPunct="0">
+                <a:spcBef>
+                  <a:spcPct val="0"/>
+                </a:spcBef>
+                <a:spcAft>
+                  <a:spcPct val="0"/>
+                </a:spcAft>
+                <a:defRPr sz="2400">
+                  <a:solidFill>
+                    <a:schemeClr val="tx1"/>
+                  </a:solidFill>
+                  <a:latin typeface="Arial" charset="0"/>
+                  <a:ea typeface="DejaVu Sans" charset="0"/>
+                  <a:cs typeface="DejaVu Sans" charset="0"/>
+                </a:defRPr>
+              </a:lvl9pPr>
+            </a:lstStyle>
+            <a:p>
+              <a:pPr algn="ctr" defTabSz="914400" eaLnBrk="1" hangingPunct="1">
+                <a:buFont typeface="Arial" charset="0"/>
+                <a:buNone/>
+              </a:pPr>
+              <a:r>
+                <a:rPr lang="en-US" sz="1200">
+                  <a:solidFill>
+                    <a:srgbClr val="FF9933"/>
+                  </a:solidFill>
+                </a:rPr>
+                <a:t>Image Pyramids</a:t>
+              </a:r>
+            </a:p>
+          </p:txBody>
+        </p:sp>
+        <p:sp>
+          <p:nvSpPr>
+            <p:cNvPr id="16" name="Content Placeholder 2"/>
+            <p:cNvSpPr txBox="1">
+              <a:spLocks/>
+            </p:cNvSpPr>
+            <p:nvPr/>
+          </p:nvSpPr>
+          <p:spPr bwMode="auto">
+            <a:xfrm>
+              <a:off x="2622824" y="4830951"/>
+              <a:ext cx="1828224" cy="552154"/>
+            </a:xfrm>
+            <a:prstGeom prst="rect">
+              <a:avLst/>
+            </a:prstGeom>
+            <a:noFill/>
+            <a:ln>
+              <a:noFill/>
+            </a:ln>
+            <a:extLst>
+              <a:ext uri="{909E8E84-426E-40DD-AFC4-6F175D3DCCD1}">
+                <a14:hiddenFill xmlns:a14="http://schemas.microsoft.com/office/drawing/2010/main">
+                  <a:solidFill>
+                    <a:srgbClr val="FFFFFF"/>
+                  </a:solidFill>
+                </a14:hiddenFill>
+              </a:ext>
+              <a:ext uri="{91240B29-F687-4F45-9708-019B960494DF}">
+                <a14:hiddenLine xmlns:a14="http://schemas.microsoft.com/office/drawing/2010/main" w="9525">
+                  <a:solidFill>
+                    <a:srgbClr val="000000"/>
+                  </a:solidFill>
+                  <a:miter lim="800000"/>
+                  <a:headEnd/>
+                  <a:tailEnd/>
+                </a14:hiddenLine>
+              </a:ext>
+            </a:extLst>
+          </p:spPr>
+          <p:txBody>
+            <a:bodyPr/>
+            <a:lstStyle>
+              <a:lvl1pPr eaLnBrk="0" hangingPunct="0">
+                <a:defRPr sz="2400">
+                  <a:solidFill>
+                    <a:schemeClr val="tx1"/>
+                  </a:solidFill>
+                  <a:latin typeface="Arial" charset="0"/>
+                  <a:ea typeface="ＭＳ Ｐゴシック" charset="0"/>
+                  <a:cs typeface="DejaVu Sans" charset="0"/>
+                </a:defRPr>
+              </a:lvl1pPr>
+              <a:lvl2pPr marL="37931725" indent="-37474525" eaLnBrk="0" hangingPunct="0">
+                <a:defRPr sz="2400">
+                  <a:solidFill>
+                    <a:schemeClr val="tx1"/>
+                  </a:solidFill>
+                  <a:latin typeface="Arial" charset="0"/>
+                  <a:ea typeface="DejaVu Sans" charset="0"/>
+                  <a:cs typeface="DejaVu Sans" charset="0"/>
+                </a:defRPr>
+              </a:lvl2pPr>
+              <a:lvl3pPr eaLnBrk="0" hangingPunct="0">
+                <a:defRPr sz="2400">
+                  <a:solidFill>
+                    <a:schemeClr val="tx1"/>
+                  </a:solidFill>
+                  <a:latin typeface="Arial" charset="0"/>
+                  <a:ea typeface="DejaVu Sans" charset="0"/>
+                  <a:cs typeface="DejaVu Sans" charset="0"/>
+                </a:defRPr>
+              </a:lvl3pPr>
+              <a:lvl4pPr eaLnBrk="0" hangingPunct="0">
+                <a:defRPr sz="2400">
+                  <a:solidFill>
+                    <a:schemeClr val="tx1"/>
+                  </a:solidFill>
+                  <a:latin typeface="Arial" charset="0"/>
+                  <a:ea typeface="DejaVu Sans" charset="0"/>
+                  <a:cs typeface="DejaVu Sans" charset="0"/>
+                </a:defRPr>
+              </a:lvl4pPr>
+              <a:lvl5pPr eaLnBrk="0" hangingPunct="0">
+                <a:defRPr sz="2400">
+                  <a:solidFill>
+                    <a:schemeClr val="tx1"/>
+                  </a:solidFill>
+                  <a:latin typeface="Arial" charset="0"/>
+                  <a:ea typeface="DejaVu Sans" charset="0"/>
+                  <a:cs typeface="DejaVu Sans" charset="0"/>
+                </a:defRPr>
+              </a:lvl5pPr>
+              <a:lvl6pPr marL="457200" eaLnBrk="0" fontAlgn="base" hangingPunct="0">
+                <a:spcBef>
+                  <a:spcPct val="0"/>
+                </a:spcBef>
+                <a:spcAft>
+                  <a:spcPct val="0"/>
+                </a:spcAft>
+                <a:defRPr sz="2400">
+                  <a:solidFill>
+                    <a:schemeClr val="tx1"/>
+                  </a:solidFill>
+                  <a:latin typeface="Arial" charset="0"/>
+                  <a:ea typeface="DejaVu Sans" charset="0"/>
+                  <a:cs typeface="DejaVu Sans" charset="0"/>
+                </a:defRPr>
+              </a:lvl6pPr>
+              <a:lvl7pPr marL="914400" eaLnBrk="0" fontAlgn="base" hangingPunct="0">
+                <a:spcBef>
+                  <a:spcPct val="0"/>
+                </a:spcBef>
+                <a:spcAft>
+                  <a:spcPct val="0"/>
+                </a:spcAft>
+                <a:defRPr sz="2400">
+                  <a:solidFill>
+                    <a:schemeClr val="tx1"/>
+                  </a:solidFill>
+                  <a:latin typeface="Arial" charset="0"/>
+                  <a:ea typeface="DejaVu Sans" charset="0"/>
+                  <a:cs typeface="DejaVu Sans" charset="0"/>
+                </a:defRPr>
+              </a:lvl7pPr>
+              <a:lvl8pPr marL="1371600" eaLnBrk="0" fontAlgn="base" hangingPunct="0">
+                <a:spcBef>
+                  <a:spcPct val="0"/>
+                </a:spcBef>
+                <a:spcAft>
+                  <a:spcPct val="0"/>
+                </a:spcAft>
+                <a:defRPr sz="2400">
+                  <a:solidFill>
+                    <a:schemeClr val="tx1"/>
+                  </a:solidFill>
+                  <a:latin typeface="Arial" charset="0"/>
+                  <a:ea typeface="DejaVu Sans" charset="0"/>
+                  <a:cs typeface="DejaVu Sans" charset="0"/>
+                </a:defRPr>
+              </a:lvl8pPr>
+              <a:lvl9pPr marL="1828800" eaLnBrk="0" fontAlgn="base" hangingPunct="0">
+                <a:spcBef>
+                  <a:spcPct val="0"/>
+                </a:spcBef>
+                <a:spcAft>
+                  <a:spcPct val="0"/>
+                </a:spcAft>
+                <a:defRPr sz="2400">
+                  <a:solidFill>
+                    <a:schemeClr val="tx1"/>
+                  </a:solidFill>
+                  <a:latin typeface="Arial" charset="0"/>
+                  <a:ea typeface="DejaVu Sans" charset="0"/>
+                  <a:cs typeface="DejaVu Sans" charset="0"/>
+                </a:defRPr>
+              </a:lvl9pPr>
+            </a:lstStyle>
+            <a:p>
+              <a:pPr algn="ctr" defTabSz="914400" eaLnBrk="1" hangingPunct="1">
+                <a:buFont typeface="Arial" charset="0"/>
+                <a:buNone/>
+              </a:pPr>
+              <a:r>
+                <a:rPr lang="en-US" sz="1200">
+                  <a:solidFill>
+                    <a:srgbClr val="FF9933"/>
+                  </a:solidFill>
+                </a:rPr>
+                <a:t>Transforms</a:t>
+              </a:r>
+            </a:p>
+          </p:txBody>
+        </p:sp>
+        <p:sp>
+          <p:nvSpPr>
+            <p:cNvPr id="17" name="Content Placeholder 2"/>
+            <p:cNvSpPr txBox="1">
+              <a:spLocks/>
+            </p:cNvSpPr>
+            <p:nvPr/>
+          </p:nvSpPr>
+          <p:spPr bwMode="auto">
+            <a:xfrm>
+              <a:off x="4146920" y="4830951"/>
+              <a:ext cx="1828224" cy="552154"/>
+            </a:xfrm>
+            <a:prstGeom prst="rect">
+              <a:avLst/>
+            </a:prstGeom>
+            <a:noFill/>
+            <a:ln>
+              <a:noFill/>
+            </a:ln>
+            <a:extLst>
+              <a:ext uri="{909E8E84-426E-40DD-AFC4-6F175D3DCCD1}">
+                <a14:hiddenFill xmlns:a14="http://schemas.microsoft.com/office/drawing/2010/main">
+                  <a:solidFill>
+                    <a:srgbClr val="FFFFFF"/>
+                  </a:solidFill>
+                </a14:hiddenFill>
+              </a:ext>
+              <a:ext uri="{91240B29-F687-4F45-9708-019B960494DF}">
+                <a14:hiddenLine xmlns:a14="http://schemas.microsoft.com/office/drawing/2010/main" w="9525">
+                  <a:solidFill>
+                    <a:srgbClr val="000000"/>
+                  </a:solidFill>
+                  <a:miter lim="800000"/>
+                  <a:headEnd/>
+                  <a:tailEnd/>
+                </a14:hiddenLine>
+              </a:ext>
+            </a:extLst>
+          </p:spPr>
+          <p:txBody>
+            <a:bodyPr/>
+            <a:lstStyle>
+              <a:lvl1pPr eaLnBrk="0" hangingPunct="0">
+                <a:defRPr sz="2400">
+                  <a:solidFill>
+                    <a:schemeClr val="tx1"/>
+                  </a:solidFill>
+                  <a:latin typeface="Arial" charset="0"/>
+                  <a:ea typeface="ＭＳ Ｐゴシック" charset="0"/>
+                  <a:cs typeface="DejaVu Sans" charset="0"/>
+                </a:defRPr>
+              </a:lvl1pPr>
+              <a:lvl2pPr marL="37931725" indent="-37474525" eaLnBrk="0" hangingPunct="0">
+                <a:defRPr sz="2400">
+                  <a:solidFill>
+                    <a:schemeClr val="tx1"/>
+                  </a:solidFill>
+                  <a:latin typeface="Arial" charset="0"/>
+                  <a:ea typeface="DejaVu Sans" charset="0"/>
+                  <a:cs typeface="DejaVu Sans" charset="0"/>
+                </a:defRPr>
+              </a:lvl2pPr>
+              <a:lvl3pPr eaLnBrk="0" hangingPunct="0">
+                <a:defRPr sz="2400">
+                  <a:solidFill>
+                    <a:schemeClr val="tx1"/>
+                  </a:solidFill>
+                  <a:latin typeface="Arial" charset="0"/>
+                  <a:ea typeface="DejaVu Sans" charset="0"/>
+                  <a:cs typeface="DejaVu Sans" charset="0"/>
+                </a:defRPr>
+              </a:lvl3pPr>
+              <a:lvl4pPr eaLnBrk="0" hangingPunct="0">
+                <a:defRPr sz="2400">
+                  <a:solidFill>
+                    <a:schemeClr val="tx1"/>
+                  </a:solidFill>
+                  <a:latin typeface="Arial" charset="0"/>
+                  <a:ea typeface="DejaVu Sans" charset="0"/>
+                  <a:cs typeface="DejaVu Sans" charset="0"/>
+                </a:defRPr>
+              </a:lvl4pPr>
+              <a:lvl5pPr eaLnBrk="0" hangingPunct="0">
+                <a:defRPr sz="2400">
+                  <a:solidFill>
+                    <a:schemeClr val="tx1"/>
+                  </a:solidFill>
+                  <a:latin typeface="Arial" charset="0"/>
+                  <a:ea typeface="DejaVu Sans" charset="0"/>
+                  <a:cs typeface="DejaVu Sans" charset="0"/>
+                </a:defRPr>
+              </a:lvl5pPr>
+              <a:lvl6pPr marL="457200" eaLnBrk="0" fontAlgn="base" hangingPunct="0">
+                <a:spcBef>
+                  <a:spcPct val="0"/>
+                </a:spcBef>
+                <a:spcAft>
+                  <a:spcPct val="0"/>
+                </a:spcAft>
+                <a:defRPr sz="2400">
+                  <a:solidFill>
+                    <a:schemeClr val="tx1"/>
+                  </a:solidFill>
+                  <a:latin typeface="Arial" charset="0"/>
+                  <a:ea typeface="DejaVu Sans" charset="0"/>
+                  <a:cs typeface="DejaVu Sans" charset="0"/>
+                </a:defRPr>
+              </a:lvl6pPr>
+              <a:lvl7pPr marL="914400" eaLnBrk="0" fontAlgn="base" hangingPunct="0">
+                <a:spcBef>
+                  <a:spcPct val="0"/>
+                </a:spcBef>
+                <a:spcAft>
+                  <a:spcPct val="0"/>
+                </a:spcAft>
+                <a:defRPr sz="2400">
+                  <a:solidFill>
+                    <a:schemeClr val="tx1"/>
+                  </a:solidFill>
+                  <a:latin typeface="Arial" charset="0"/>
+                  <a:ea typeface="DejaVu Sans" charset="0"/>
+                  <a:cs typeface="DejaVu Sans" charset="0"/>
+                </a:defRPr>
+              </a:lvl7pPr>
+              <a:lvl8pPr marL="1371600" eaLnBrk="0" fontAlgn="base" hangingPunct="0">
+                <a:spcBef>
+                  <a:spcPct val="0"/>
+                </a:spcBef>
+                <a:spcAft>
+                  <a:spcPct val="0"/>
+                </a:spcAft>
+                <a:defRPr sz="2400">
+                  <a:solidFill>
+                    <a:schemeClr val="tx1"/>
+                  </a:solidFill>
+                  <a:latin typeface="Arial" charset="0"/>
+                  <a:ea typeface="DejaVu Sans" charset="0"/>
+                  <a:cs typeface="DejaVu Sans" charset="0"/>
+                </a:defRPr>
+              </a:lvl8pPr>
+              <a:lvl9pPr marL="1828800" eaLnBrk="0" fontAlgn="base" hangingPunct="0">
+                <a:spcBef>
+                  <a:spcPct val="0"/>
+                </a:spcBef>
+                <a:spcAft>
+                  <a:spcPct val="0"/>
+                </a:spcAft>
+                <a:defRPr sz="2400">
+                  <a:solidFill>
+                    <a:schemeClr val="tx1"/>
+                  </a:solidFill>
+                  <a:latin typeface="Arial" charset="0"/>
+                  <a:ea typeface="DejaVu Sans" charset="0"/>
+                  <a:cs typeface="DejaVu Sans" charset="0"/>
+                </a:defRPr>
+              </a:lvl9pPr>
+            </a:lstStyle>
+            <a:p>
+              <a:pPr algn="ctr" defTabSz="914400" eaLnBrk="1" hangingPunct="1">
+                <a:buFont typeface="Arial" charset="0"/>
+                <a:buNone/>
+              </a:pPr>
+              <a:r>
+                <a:rPr lang="en-US" sz="1200">
+                  <a:solidFill>
+                    <a:srgbClr val="FF9933"/>
+                  </a:solidFill>
+                </a:rPr>
+                <a:t>Fitting</a:t>
+              </a:r>
+            </a:p>
+          </p:txBody>
+        </p:sp>
+        <p:sp>
+          <p:nvSpPr>
+            <p:cNvPr id="18" name="Content Placeholder 2"/>
+            <p:cNvSpPr txBox="1">
+              <a:spLocks/>
+            </p:cNvSpPr>
+            <p:nvPr/>
+          </p:nvSpPr>
+          <p:spPr bwMode="auto">
+            <a:xfrm>
+              <a:off x="1338846" y="1292499"/>
+              <a:ext cx="4815935" cy="366806"/>
+            </a:xfrm>
+            <a:prstGeom prst="rect">
+              <a:avLst/>
+            </a:prstGeom>
+            <a:noFill/>
+            <a:ln>
+              <a:noFill/>
+            </a:ln>
+            <a:extLst>
+              <a:ext uri="{909E8E84-426E-40DD-AFC4-6F175D3DCCD1}">
+                <a14:hiddenFill xmlns:a14="http://schemas.microsoft.com/office/drawing/2010/main">
+                  <a:solidFill>
+                    <a:srgbClr val="FFFFFF"/>
+                  </a:solidFill>
+                </a14:hiddenFill>
+              </a:ext>
+              <a:ext uri="{91240B29-F687-4F45-9708-019B960494DF}">
+                <a14:hiddenLine xmlns:a14="http://schemas.microsoft.com/office/drawing/2010/main" w="9525">
+                  <a:solidFill>
+                    <a:srgbClr val="000000"/>
+                  </a:solidFill>
+                  <a:miter lim="800000"/>
+                  <a:headEnd/>
+                  <a:tailEnd/>
+                </a14:hiddenLine>
+              </a:ext>
+            </a:extLst>
+          </p:spPr>
+          <p:txBody>
+            <a:bodyPr/>
+            <a:lstStyle>
+              <a:lvl1pPr eaLnBrk="0" hangingPunct="0">
+                <a:defRPr sz="2400">
+                  <a:solidFill>
+                    <a:schemeClr val="tx1"/>
+                  </a:solidFill>
+                  <a:latin typeface="Arial" charset="0"/>
+                  <a:ea typeface="ＭＳ Ｐゴシック" charset="0"/>
+                  <a:cs typeface="DejaVu Sans" charset="0"/>
+                </a:defRPr>
+              </a:lvl1pPr>
+              <a:lvl2pPr marL="37931725" indent="-37474525" eaLnBrk="0" hangingPunct="0">
+                <a:defRPr sz="2400">
+                  <a:solidFill>
+                    <a:schemeClr val="tx1"/>
+                  </a:solidFill>
+                  <a:latin typeface="Arial" charset="0"/>
+                  <a:ea typeface="DejaVu Sans" charset="0"/>
+                  <a:cs typeface="DejaVu Sans" charset="0"/>
+                </a:defRPr>
+              </a:lvl2pPr>
+              <a:lvl3pPr eaLnBrk="0" hangingPunct="0">
+                <a:defRPr sz="2400">
+                  <a:solidFill>
+                    <a:schemeClr val="tx1"/>
+                  </a:solidFill>
+                  <a:latin typeface="Arial" charset="0"/>
+                  <a:ea typeface="DejaVu Sans" charset="0"/>
+                  <a:cs typeface="DejaVu Sans" charset="0"/>
+                </a:defRPr>
+              </a:lvl3pPr>
+              <a:lvl4pPr eaLnBrk="0" hangingPunct="0">
+                <a:defRPr sz="2400">
+                  <a:solidFill>
+                    <a:schemeClr val="tx1"/>
+                  </a:solidFill>
+                  <a:latin typeface="Arial" charset="0"/>
+                  <a:ea typeface="DejaVu Sans" charset="0"/>
+                  <a:cs typeface="DejaVu Sans" charset="0"/>
+                </a:defRPr>
+              </a:lvl4pPr>
+              <a:lvl5pPr eaLnBrk="0" hangingPunct="0">
+                <a:defRPr sz="2400">
+                  <a:solidFill>
+                    <a:schemeClr val="tx1"/>
+                  </a:solidFill>
+                  <a:latin typeface="Arial" charset="0"/>
+                  <a:ea typeface="DejaVu Sans" charset="0"/>
+                  <a:cs typeface="DejaVu Sans" charset="0"/>
+                </a:defRPr>
+              </a:lvl5pPr>
+              <a:lvl6pPr marL="457200" eaLnBrk="0" fontAlgn="base" hangingPunct="0">
+                <a:spcBef>
+                  <a:spcPct val="0"/>
+                </a:spcBef>
+                <a:spcAft>
+                  <a:spcPct val="0"/>
+                </a:spcAft>
+                <a:defRPr sz="2400">
+                  <a:solidFill>
+                    <a:schemeClr val="tx1"/>
+                  </a:solidFill>
+                  <a:latin typeface="Arial" charset="0"/>
+                  <a:ea typeface="DejaVu Sans" charset="0"/>
+                  <a:cs typeface="DejaVu Sans" charset="0"/>
+                </a:defRPr>
+              </a:lvl6pPr>
+              <a:lvl7pPr marL="914400" eaLnBrk="0" fontAlgn="base" hangingPunct="0">
+                <a:spcBef>
+                  <a:spcPct val="0"/>
+                </a:spcBef>
+                <a:spcAft>
+                  <a:spcPct val="0"/>
+                </a:spcAft>
+                <a:defRPr sz="2400">
+                  <a:solidFill>
+                    <a:schemeClr val="tx1"/>
+                  </a:solidFill>
+                  <a:latin typeface="Arial" charset="0"/>
+                  <a:ea typeface="DejaVu Sans" charset="0"/>
+                  <a:cs typeface="DejaVu Sans" charset="0"/>
+                </a:defRPr>
+              </a:lvl7pPr>
+              <a:lvl8pPr marL="1371600" eaLnBrk="0" fontAlgn="base" hangingPunct="0">
+                <a:spcBef>
+                  <a:spcPct val="0"/>
+                </a:spcBef>
+                <a:spcAft>
+                  <a:spcPct val="0"/>
+                </a:spcAft>
+                <a:defRPr sz="2400">
+                  <a:solidFill>
+                    <a:schemeClr val="tx1"/>
+                  </a:solidFill>
+                  <a:latin typeface="Arial" charset="0"/>
+                  <a:ea typeface="DejaVu Sans" charset="0"/>
+                  <a:cs typeface="DejaVu Sans" charset="0"/>
+                </a:defRPr>
+              </a:lvl8pPr>
+              <a:lvl9pPr marL="1828800" eaLnBrk="0" fontAlgn="base" hangingPunct="0">
+                <a:spcBef>
+                  <a:spcPct val="0"/>
+                </a:spcBef>
+                <a:spcAft>
+                  <a:spcPct val="0"/>
+                </a:spcAft>
+                <a:defRPr sz="2400">
+                  <a:solidFill>
+                    <a:schemeClr val="tx1"/>
+                  </a:solidFill>
+                  <a:latin typeface="Arial" charset="0"/>
+                  <a:ea typeface="DejaVu Sans" charset="0"/>
+                  <a:cs typeface="DejaVu Sans" charset="0"/>
+                </a:defRPr>
+              </a:lvl9pPr>
+            </a:lstStyle>
+            <a:p>
+              <a:pPr defTabSz="914400" eaLnBrk="1" hangingPunct="1">
+                <a:buFont typeface="Arial" charset="0"/>
+                <a:buNone/>
+              </a:pPr>
+              <a:r>
+                <a:rPr lang="en-US" sz="1200" b="1" dirty="0">
+                  <a:solidFill>
+                    <a:srgbClr val="FF9933"/>
+                  </a:solidFill>
+                </a:rPr>
+                <a:t>Image</a:t>
+              </a:r>
+              <a:r>
+                <a:rPr lang="en-US" sz="1200" dirty="0">
+                  <a:solidFill>
+                    <a:srgbClr val="FF9933"/>
+                  </a:solidFill>
+                </a:rPr>
+                <a:t> </a:t>
+              </a:r>
+              <a:r>
+                <a:rPr lang="en-US" sz="1200" b="1" dirty="0">
+                  <a:solidFill>
+                    <a:srgbClr val="FF9933"/>
+                  </a:solidFill>
+                </a:rPr>
+                <a:t>processing</a:t>
+              </a:r>
+            </a:p>
+          </p:txBody>
+        </p:sp>
+        <p:sp>
+          <p:nvSpPr>
+            <p:cNvPr id="19" name="Content Placeholder 2"/>
+            <p:cNvSpPr txBox="1">
+              <a:spLocks/>
+            </p:cNvSpPr>
+            <p:nvPr/>
+          </p:nvSpPr>
+          <p:spPr bwMode="auto">
+            <a:xfrm>
+              <a:off x="5897422" y="1292499"/>
+              <a:ext cx="4815935" cy="366806"/>
+            </a:xfrm>
+            <a:prstGeom prst="rect">
+              <a:avLst/>
+            </a:prstGeom>
+            <a:noFill/>
+            <a:ln>
+              <a:noFill/>
+            </a:ln>
+            <a:extLst>
+              <a:ext uri="{909E8E84-426E-40DD-AFC4-6F175D3DCCD1}">
+                <a14:hiddenFill xmlns:a14="http://schemas.microsoft.com/office/drawing/2010/main">
+                  <a:solidFill>
+                    <a:srgbClr val="FFFFFF"/>
+                  </a:solidFill>
+                </a14:hiddenFill>
+              </a:ext>
+              <a:ext uri="{91240B29-F687-4F45-9708-019B960494DF}">
+                <a14:hiddenLine xmlns:a14="http://schemas.microsoft.com/office/drawing/2010/main" w="9525">
+                  <a:solidFill>
+                    <a:srgbClr val="000000"/>
+                  </a:solidFill>
+                  <a:miter lim="800000"/>
+                  <a:headEnd/>
+                  <a:tailEnd/>
+                </a14:hiddenLine>
+              </a:ext>
+            </a:extLst>
+          </p:spPr>
+          <p:txBody>
+            <a:bodyPr/>
+            <a:lstStyle>
+              <a:lvl1pPr eaLnBrk="0" hangingPunct="0">
+                <a:defRPr sz="2400">
+                  <a:solidFill>
+                    <a:schemeClr val="tx1"/>
+                  </a:solidFill>
+                  <a:latin typeface="Arial" charset="0"/>
+                  <a:ea typeface="ＭＳ Ｐゴシック" charset="0"/>
+                  <a:cs typeface="DejaVu Sans" charset="0"/>
+                </a:defRPr>
+              </a:lvl1pPr>
+              <a:lvl2pPr marL="37931725" indent="-37474525" eaLnBrk="0" hangingPunct="0">
+                <a:defRPr sz="2400">
+                  <a:solidFill>
+                    <a:schemeClr val="tx1"/>
+                  </a:solidFill>
+                  <a:latin typeface="Arial" charset="0"/>
+                  <a:ea typeface="DejaVu Sans" charset="0"/>
+                  <a:cs typeface="DejaVu Sans" charset="0"/>
+                </a:defRPr>
+              </a:lvl2pPr>
+              <a:lvl3pPr eaLnBrk="0" hangingPunct="0">
+                <a:defRPr sz="2400">
+                  <a:solidFill>
+                    <a:schemeClr val="tx1"/>
+                  </a:solidFill>
+                  <a:latin typeface="Arial" charset="0"/>
+                  <a:ea typeface="DejaVu Sans" charset="0"/>
+                  <a:cs typeface="DejaVu Sans" charset="0"/>
+                </a:defRPr>
+              </a:lvl3pPr>
+              <a:lvl4pPr eaLnBrk="0" hangingPunct="0">
+                <a:defRPr sz="2400">
+                  <a:solidFill>
+                    <a:schemeClr val="tx1"/>
+                  </a:solidFill>
+                  <a:latin typeface="Arial" charset="0"/>
+                  <a:ea typeface="DejaVu Sans" charset="0"/>
+                  <a:cs typeface="DejaVu Sans" charset="0"/>
+                </a:defRPr>
+              </a:lvl4pPr>
+              <a:lvl5pPr eaLnBrk="0" hangingPunct="0">
+                <a:defRPr sz="2400">
+                  <a:solidFill>
+                    <a:schemeClr val="tx1"/>
+                  </a:solidFill>
+                  <a:latin typeface="Arial" charset="0"/>
+                  <a:ea typeface="DejaVu Sans" charset="0"/>
+                  <a:cs typeface="DejaVu Sans" charset="0"/>
+                </a:defRPr>
+              </a:lvl5pPr>
+              <a:lvl6pPr marL="457200" eaLnBrk="0" fontAlgn="base" hangingPunct="0">
+                <a:spcBef>
+                  <a:spcPct val="0"/>
+                </a:spcBef>
+                <a:spcAft>
+                  <a:spcPct val="0"/>
+                </a:spcAft>
+                <a:defRPr sz="2400">
+                  <a:solidFill>
+                    <a:schemeClr val="tx1"/>
+                  </a:solidFill>
+                  <a:latin typeface="Arial" charset="0"/>
+                  <a:ea typeface="DejaVu Sans" charset="0"/>
+                  <a:cs typeface="DejaVu Sans" charset="0"/>
+                </a:defRPr>
+              </a:lvl6pPr>
+              <a:lvl7pPr marL="914400" eaLnBrk="0" fontAlgn="base" hangingPunct="0">
+                <a:spcBef>
+                  <a:spcPct val="0"/>
+                </a:spcBef>
+                <a:spcAft>
+                  <a:spcPct val="0"/>
+                </a:spcAft>
+                <a:defRPr sz="2400">
+                  <a:solidFill>
+                    <a:schemeClr val="tx1"/>
+                  </a:solidFill>
+                  <a:latin typeface="Arial" charset="0"/>
+                  <a:ea typeface="DejaVu Sans" charset="0"/>
+                  <a:cs typeface="DejaVu Sans" charset="0"/>
+                </a:defRPr>
+              </a:lvl7pPr>
+              <a:lvl8pPr marL="1371600" eaLnBrk="0" fontAlgn="base" hangingPunct="0">
+                <a:spcBef>
+                  <a:spcPct val="0"/>
+                </a:spcBef>
+                <a:spcAft>
+                  <a:spcPct val="0"/>
+                </a:spcAft>
+                <a:defRPr sz="2400">
+                  <a:solidFill>
+                    <a:schemeClr val="tx1"/>
+                  </a:solidFill>
+                  <a:latin typeface="Arial" charset="0"/>
+                  <a:ea typeface="DejaVu Sans" charset="0"/>
+                  <a:cs typeface="DejaVu Sans" charset="0"/>
+                </a:defRPr>
+              </a:lvl8pPr>
+              <a:lvl9pPr marL="1828800" eaLnBrk="0" fontAlgn="base" hangingPunct="0">
+                <a:spcBef>
+                  <a:spcPct val="0"/>
+                </a:spcBef>
+                <a:spcAft>
+                  <a:spcPct val="0"/>
+                </a:spcAft>
+                <a:defRPr sz="2400">
+                  <a:solidFill>
+                    <a:schemeClr val="tx1"/>
+                  </a:solidFill>
+                  <a:latin typeface="Arial" charset="0"/>
+                  <a:ea typeface="DejaVu Sans" charset="0"/>
+                  <a:cs typeface="DejaVu Sans" charset="0"/>
+                </a:defRPr>
+              </a:lvl9pPr>
+            </a:lstStyle>
+            <a:p>
+              <a:pPr defTabSz="914400" eaLnBrk="1" hangingPunct="1">
+                <a:buFont typeface="Arial" charset="0"/>
+                <a:buNone/>
+              </a:pPr>
+              <a:r>
+                <a:rPr lang="en-US" sz="1200" b="1" dirty="0">
+                  <a:solidFill>
+                    <a:srgbClr val="FF9933"/>
+                  </a:solidFill>
+                </a:rPr>
+                <a:t>Video, Stereo, and 3D</a:t>
+              </a:r>
+            </a:p>
+          </p:txBody>
+        </p:sp>
+        <p:pic>
+          <p:nvPicPr>
+            <p:cNvPr id="20" name="Picture 6"/>
+            <p:cNvPicPr>
+              <a:picLocks noChangeAspect="1" noChangeArrowheads="1"/>
+            </p:cNvPicPr>
+            <p:nvPr/>
+          </p:nvPicPr>
+          <p:blipFill>
+            <a:blip r:embed="rId9" cstate="screen">
+              <a:extLst>
+                <a:ext uri="{28A0092B-C50C-407E-A947-70E740481C1C}">
+                  <a14:useLocalDpi xmlns:a14="http://schemas.microsoft.com/office/drawing/2010/main"/>
+                </a:ext>
+              </a:extLst>
+            </a:blip>
+            <a:srcRect/>
+            <a:stretch>
+              <a:fillRect/>
+            </a:stretch>
+          </p:blipFill>
+          <p:spPr bwMode="auto">
+            <a:xfrm>
+              <a:off x="5975144" y="1764294"/>
+              <a:ext cx="1242359" cy="1209295"/>
+            </a:xfrm>
+            <a:prstGeom prst="rect">
+              <a:avLst/>
+            </a:prstGeom>
+            <a:noFill/>
+            <a:ln>
+              <a:noFill/>
+            </a:ln>
+            <a:extLst>
+              <a:ext uri="{909E8E84-426E-40DD-AFC4-6F175D3DCCD1}">
+                <a14:hiddenFill xmlns:a14="http://schemas.microsoft.com/office/drawing/2010/main">
+                  <a:solidFill>
+                    <a:srgbClr val="FFFFFF"/>
+                  </a:solidFill>
+                </a14:hiddenFill>
+              </a:ext>
+              <a:ext uri="{91240B29-F687-4F45-9708-019B960494DF}">
+                <a14:hiddenLine xmlns:a14="http://schemas.microsoft.com/office/drawing/2010/main" w="9525">
+                  <a:solidFill>
+                    <a:srgbClr val="000000"/>
+                  </a:solidFill>
+                  <a:miter lim="800000"/>
+                  <a:headEnd/>
+                  <a:tailEnd/>
+                </a14:hiddenLine>
+              </a:ext>
+            </a:extLst>
+          </p:spPr>
+        </p:pic>
+        <p:sp>
+          <p:nvSpPr>
+            <p:cNvPr id="21" name="Content Placeholder 2"/>
+            <p:cNvSpPr txBox="1">
+              <a:spLocks/>
+            </p:cNvSpPr>
+            <p:nvPr/>
+          </p:nvSpPr>
+          <p:spPr bwMode="auto">
+            <a:xfrm>
+              <a:off x="5693406" y="2983956"/>
+              <a:ext cx="1828224" cy="552154"/>
+            </a:xfrm>
+            <a:prstGeom prst="rect">
+              <a:avLst/>
+            </a:prstGeom>
+            <a:noFill/>
+            <a:ln>
+              <a:noFill/>
+            </a:ln>
+            <a:extLst>
+              <a:ext uri="{909E8E84-426E-40DD-AFC4-6F175D3DCCD1}">
+                <a14:hiddenFill xmlns:a14="http://schemas.microsoft.com/office/drawing/2010/main">
+                  <a:solidFill>
+                    <a:srgbClr val="FFFFFF"/>
+                  </a:solidFill>
+                </a14:hiddenFill>
+              </a:ext>
+              <a:ext uri="{91240B29-F687-4F45-9708-019B960494DF}">
+                <a14:hiddenLine xmlns:a14="http://schemas.microsoft.com/office/drawing/2010/main" w="9525">
+                  <a:solidFill>
+                    <a:srgbClr val="000000"/>
+                  </a:solidFill>
+                  <a:miter lim="800000"/>
+                  <a:headEnd/>
+                  <a:tailEnd/>
+                </a14:hiddenLine>
+              </a:ext>
+            </a:extLst>
+          </p:spPr>
+          <p:txBody>
+            <a:bodyPr/>
+            <a:lstStyle>
+              <a:lvl1pPr eaLnBrk="0" hangingPunct="0">
+                <a:defRPr sz="2400">
+                  <a:solidFill>
+                    <a:schemeClr val="tx1"/>
+                  </a:solidFill>
+                  <a:latin typeface="Arial" charset="0"/>
+                  <a:ea typeface="ＭＳ Ｐゴシック" charset="0"/>
+                  <a:cs typeface="DejaVu Sans" charset="0"/>
+                </a:defRPr>
+              </a:lvl1pPr>
+              <a:lvl2pPr marL="37931725" indent="-37474525" eaLnBrk="0" hangingPunct="0">
+                <a:defRPr sz="2400">
+                  <a:solidFill>
+                    <a:schemeClr val="tx1"/>
+                  </a:solidFill>
+                  <a:latin typeface="Arial" charset="0"/>
+                  <a:ea typeface="DejaVu Sans" charset="0"/>
+                  <a:cs typeface="DejaVu Sans" charset="0"/>
+                </a:defRPr>
+              </a:lvl2pPr>
+              <a:lvl3pPr eaLnBrk="0" hangingPunct="0">
+                <a:defRPr sz="2400">
+                  <a:solidFill>
+                    <a:schemeClr val="tx1"/>
+                  </a:solidFill>
+                  <a:latin typeface="Arial" charset="0"/>
+                  <a:ea typeface="DejaVu Sans" charset="0"/>
+                  <a:cs typeface="DejaVu Sans" charset="0"/>
+                </a:defRPr>
+              </a:lvl3pPr>
+              <a:lvl4pPr eaLnBrk="0" hangingPunct="0">
+                <a:defRPr sz="2400">
+                  <a:solidFill>
+                    <a:schemeClr val="tx1"/>
+                  </a:solidFill>
+                  <a:latin typeface="Arial" charset="0"/>
+                  <a:ea typeface="DejaVu Sans" charset="0"/>
+                  <a:cs typeface="DejaVu Sans" charset="0"/>
+                </a:defRPr>
+              </a:lvl4pPr>
+              <a:lvl5pPr eaLnBrk="0" hangingPunct="0">
+                <a:defRPr sz="2400">
+                  <a:solidFill>
+                    <a:schemeClr val="tx1"/>
+                  </a:solidFill>
+                  <a:latin typeface="Arial" charset="0"/>
+                  <a:ea typeface="DejaVu Sans" charset="0"/>
+                  <a:cs typeface="DejaVu Sans" charset="0"/>
+                </a:defRPr>
+              </a:lvl5pPr>
+              <a:lvl6pPr marL="457200" eaLnBrk="0" fontAlgn="base" hangingPunct="0">
+                <a:spcBef>
+                  <a:spcPct val="0"/>
+                </a:spcBef>
+                <a:spcAft>
+                  <a:spcPct val="0"/>
+                </a:spcAft>
+                <a:defRPr sz="2400">
+                  <a:solidFill>
+                    <a:schemeClr val="tx1"/>
+                  </a:solidFill>
+                  <a:latin typeface="Arial" charset="0"/>
+                  <a:ea typeface="DejaVu Sans" charset="0"/>
+                  <a:cs typeface="DejaVu Sans" charset="0"/>
+                </a:defRPr>
+              </a:lvl6pPr>
+              <a:lvl7pPr marL="914400" eaLnBrk="0" fontAlgn="base" hangingPunct="0">
+                <a:spcBef>
+                  <a:spcPct val="0"/>
+                </a:spcBef>
+                <a:spcAft>
+                  <a:spcPct val="0"/>
+                </a:spcAft>
+                <a:defRPr sz="2400">
+                  <a:solidFill>
+                    <a:schemeClr val="tx1"/>
+                  </a:solidFill>
+                  <a:latin typeface="Arial" charset="0"/>
+                  <a:ea typeface="DejaVu Sans" charset="0"/>
+                  <a:cs typeface="DejaVu Sans" charset="0"/>
+                </a:defRPr>
+              </a:lvl7pPr>
+              <a:lvl8pPr marL="1371600" eaLnBrk="0" fontAlgn="base" hangingPunct="0">
+                <a:spcBef>
+                  <a:spcPct val="0"/>
+                </a:spcBef>
+                <a:spcAft>
+                  <a:spcPct val="0"/>
+                </a:spcAft>
+                <a:defRPr sz="2400">
+                  <a:solidFill>
+                    <a:schemeClr val="tx1"/>
+                  </a:solidFill>
+                  <a:latin typeface="Arial" charset="0"/>
+                  <a:ea typeface="DejaVu Sans" charset="0"/>
+                  <a:cs typeface="DejaVu Sans" charset="0"/>
+                </a:defRPr>
+              </a:lvl8pPr>
+              <a:lvl9pPr marL="1828800" eaLnBrk="0" fontAlgn="base" hangingPunct="0">
+                <a:spcBef>
+                  <a:spcPct val="0"/>
+                </a:spcBef>
+                <a:spcAft>
+                  <a:spcPct val="0"/>
+                </a:spcAft>
+                <a:defRPr sz="2400">
+                  <a:solidFill>
+                    <a:schemeClr val="tx1"/>
+                  </a:solidFill>
+                  <a:latin typeface="Arial" charset="0"/>
+                  <a:ea typeface="DejaVu Sans" charset="0"/>
+                  <a:cs typeface="DejaVu Sans" charset="0"/>
+                </a:defRPr>
+              </a:lvl9pPr>
+            </a:lstStyle>
+            <a:p>
+              <a:pPr algn="ctr" defTabSz="914400" eaLnBrk="1" hangingPunct="1">
+                <a:buFont typeface="Arial" charset="0"/>
+                <a:buNone/>
+              </a:pPr>
+              <a:r>
+                <a:rPr lang="en-US" sz="1200">
+                  <a:solidFill>
+                    <a:srgbClr val="FF9933"/>
+                  </a:solidFill>
+                </a:rPr>
+                <a:t>Camera Calibration</a:t>
+              </a:r>
+            </a:p>
+          </p:txBody>
+        </p:sp>
+        <p:pic>
+          <p:nvPicPr>
+            <p:cNvPr id="22" name="Picture 7"/>
+            <p:cNvPicPr>
+              <a:picLocks noChangeAspect="1" noChangeArrowheads="1"/>
+            </p:cNvPicPr>
+            <p:nvPr/>
+          </p:nvPicPr>
+          <p:blipFill>
+            <a:blip r:embed="rId10" cstate="screen">
+              <a:extLst>
+                <a:ext uri="{28A0092B-C50C-407E-A947-70E740481C1C}">
+                  <a14:useLocalDpi xmlns:a14="http://schemas.microsoft.com/office/drawing/2010/main"/>
+                </a:ext>
+              </a:extLst>
+            </a:blip>
+            <a:srcRect/>
+            <a:stretch>
+              <a:fillRect/>
+            </a:stretch>
+          </p:blipFill>
+          <p:spPr bwMode="auto">
+            <a:xfrm>
+              <a:off x="7521629" y="1764294"/>
+              <a:ext cx="1219969" cy="1209295"/>
+            </a:xfrm>
+            <a:prstGeom prst="rect">
+              <a:avLst/>
+            </a:prstGeom>
+            <a:noFill/>
+            <a:ln>
+              <a:noFill/>
+            </a:ln>
+            <a:extLst>
+              <a:ext uri="{909E8E84-426E-40DD-AFC4-6F175D3DCCD1}">
+                <a14:hiddenFill xmlns:a14="http://schemas.microsoft.com/office/drawing/2010/main">
+                  <a:solidFill>
+                    <a:srgbClr val="FFFFFF"/>
+                  </a:solidFill>
+                </a14:hiddenFill>
+              </a:ext>
+              <a:ext uri="{91240B29-F687-4F45-9708-019B960494DF}">
+                <a14:hiddenLine xmlns:a14="http://schemas.microsoft.com/office/drawing/2010/main" w="9525">
+                  <a:solidFill>
+                    <a:srgbClr val="000000"/>
+                  </a:solidFill>
+                  <a:miter lim="800000"/>
+                  <a:headEnd/>
+                  <a:tailEnd/>
+                </a14:hiddenLine>
+              </a:ext>
+            </a:extLst>
+          </p:spPr>
+        </p:pic>
+        <p:sp>
+          <p:nvSpPr>
+            <p:cNvPr id="23" name="Content Placeholder 2"/>
+            <p:cNvSpPr txBox="1">
+              <a:spLocks/>
+            </p:cNvSpPr>
+            <p:nvPr/>
+          </p:nvSpPr>
+          <p:spPr bwMode="auto">
+            <a:xfrm>
+              <a:off x="7193310" y="2983956"/>
+              <a:ext cx="1828224" cy="552154"/>
+            </a:xfrm>
+            <a:prstGeom prst="rect">
+              <a:avLst/>
+            </a:prstGeom>
+            <a:noFill/>
+            <a:ln>
+              <a:noFill/>
+            </a:ln>
+            <a:extLst>
+              <a:ext uri="{909E8E84-426E-40DD-AFC4-6F175D3DCCD1}">
+                <a14:hiddenFill xmlns:a14="http://schemas.microsoft.com/office/drawing/2010/main">
+                  <a:solidFill>
+                    <a:srgbClr val="FFFFFF"/>
+                  </a:solidFill>
+                </a14:hiddenFill>
+              </a:ext>
+              <a:ext uri="{91240B29-F687-4F45-9708-019B960494DF}">
+                <a14:hiddenLine xmlns:a14="http://schemas.microsoft.com/office/drawing/2010/main" w="9525">
+                  <a:solidFill>
+                    <a:srgbClr val="000000"/>
+                  </a:solidFill>
+                  <a:miter lim="800000"/>
+                  <a:headEnd/>
+                  <a:tailEnd/>
+                </a14:hiddenLine>
+              </a:ext>
+            </a:extLst>
+          </p:spPr>
+          <p:txBody>
+            <a:bodyPr/>
+            <a:lstStyle>
+              <a:lvl1pPr eaLnBrk="0" hangingPunct="0">
+                <a:defRPr sz="2400">
+                  <a:solidFill>
+                    <a:schemeClr val="tx1"/>
+                  </a:solidFill>
+                  <a:latin typeface="Arial" charset="0"/>
+                  <a:ea typeface="ＭＳ Ｐゴシック" charset="0"/>
+                  <a:cs typeface="DejaVu Sans" charset="0"/>
+                </a:defRPr>
+              </a:lvl1pPr>
+              <a:lvl2pPr marL="37931725" indent="-37474525" eaLnBrk="0" hangingPunct="0">
+                <a:defRPr sz="2400">
+                  <a:solidFill>
+                    <a:schemeClr val="tx1"/>
+                  </a:solidFill>
+                  <a:latin typeface="Arial" charset="0"/>
+                  <a:ea typeface="DejaVu Sans" charset="0"/>
+                  <a:cs typeface="DejaVu Sans" charset="0"/>
+                </a:defRPr>
+              </a:lvl2pPr>
+              <a:lvl3pPr eaLnBrk="0" hangingPunct="0">
+                <a:defRPr sz="2400">
+                  <a:solidFill>
+                    <a:schemeClr val="tx1"/>
+                  </a:solidFill>
+                  <a:latin typeface="Arial" charset="0"/>
+                  <a:ea typeface="DejaVu Sans" charset="0"/>
+                  <a:cs typeface="DejaVu Sans" charset="0"/>
+                </a:defRPr>
+              </a:lvl3pPr>
+              <a:lvl4pPr eaLnBrk="0" hangingPunct="0">
+                <a:defRPr sz="2400">
+                  <a:solidFill>
+                    <a:schemeClr val="tx1"/>
+                  </a:solidFill>
+                  <a:latin typeface="Arial" charset="0"/>
+                  <a:ea typeface="DejaVu Sans" charset="0"/>
+                  <a:cs typeface="DejaVu Sans" charset="0"/>
+                </a:defRPr>
+              </a:lvl4pPr>
+              <a:lvl5pPr eaLnBrk="0" hangingPunct="0">
+                <a:defRPr sz="2400">
+                  <a:solidFill>
+                    <a:schemeClr val="tx1"/>
+                  </a:solidFill>
+                  <a:latin typeface="Arial" charset="0"/>
+                  <a:ea typeface="DejaVu Sans" charset="0"/>
+                  <a:cs typeface="DejaVu Sans" charset="0"/>
+                </a:defRPr>
+              </a:lvl5pPr>
+              <a:lvl6pPr marL="457200" eaLnBrk="0" fontAlgn="base" hangingPunct="0">
+                <a:spcBef>
+                  <a:spcPct val="0"/>
+                </a:spcBef>
+                <a:spcAft>
+                  <a:spcPct val="0"/>
+                </a:spcAft>
+                <a:defRPr sz="2400">
+                  <a:solidFill>
+                    <a:schemeClr val="tx1"/>
+                  </a:solidFill>
+                  <a:latin typeface="Arial" charset="0"/>
+                  <a:ea typeface="DejaVu Sans" charset="0"/>
+                  <a:cs typeface="DejaVu Sans" charset="0"/>
+                </a:defRPr>
+              </a:lvl6pPr>
+              <a:lvl7pPr marL="914400" eaLnBrk="0" fontAlgn="base" hangingPunct="0">
+                <a:spcBef>
+                  <a:spcPct val="0"/>
+                </a:spcBef>
+                <a:spcAft>
+                  <a:spcPct val="0"/>
+                </a:spcAft>
+                <a:defRPr sz="2400">
+                  <a:solidFill>
+                    <a:schemeClr val="tx1"/>
+                  </a:solidFill>
+                  <a:latin typeface="Arial" charset="0"/>
+                  <a:ea typeface="DejaVu Sans" charset="0"/>
+                  <a:cs typeface="DejaVu Sans" charset="0"/>
+                </a:defRPr>
+              </a:lvl7pPr>
+              <a:lvl8pPr marL="1371600" eaLnBrk="0" fontAlgn="base" hangingPunct="0">
+                <a:spcBef>
+                  <a:spcPct val="0"/>
+                </a:spcBef>
+                <a:spcAft>
+                  <a:spcPct val="0"/>
+                </a:spcAft>
+                <a:defRPr sz="2400">
+                  <a:solidFill>
+                    <a:schemeClr val="tx1"/>
+                  </a:solidFill>
+                  <a:latin typeface="Arial" charset="0"/>
+                  <a:ea typeface="DejaVu Sans" charset="0"/>
+                  <a:cs typeface="DejaVu Sans" charset="0"/>
+                </a:defRPr>
+              </a:lvl8pPr>
+              <a:lvl9pPr marL="1828800" eaLnBrk="0" fontAlgn="base" hangingPunct="0">
+                <a:spcBef>
+                  <a:spcPct val="0"/>
+                </a:spcBef>
+                <a:spcAft>
+                  <a:spcPct val="0"/>
+                </a:spcAft>
+                <a:defRPr sz="2400">
+                  <a:solidFill>
+                    <a:schemeClr val="tx1"/>
+                  </a:solidFill>
+                  <a:latin typeface="Arial" charset="0"/>
+                  <a:ea typeface="DejaVu Sans" charset="0"/>
+                  <a:cs typeface="DejaVu Sans" charset="0"/>
+                </a:defRPr>
+              </a:lvl9pPr>
+            </a:lstStyle>
+            <a:p>
+              <a:pPr algn="ctr" defTabSz="914400" eaLnBrk="1" hangingPunct="1">
+                <a:buFont typeface="Arial" charset="0"/>
+                <a:buNone/>
+              </a:pPr>
+              <a:r>
+                <a:rPr lang="en-US" sz="1200">
+                  <a:solidFill>
+                    <a:srgbClr val="FF9933"/>
+                  </a:solidFill>
+                </a:rPr>
+                <a:t>Features</a:t>
+              </a:r>
+            </a:p>
+          </p:txBody>
+        </p:sp>
+        <p:pic>
+          <p:nvPicPr>
+            <p:cNvPr id="24" name="Picture 8"/>
+            <p:cNvPicPr>
+              <a:picLocks noChangeAspect="1" noChangeArrowheads="1"/>
+            </p:cNvPicPr>
+            <p:nvPr/>
+          </p:nvPicPr>
+          <p:blipFill>
+            <a:blip r:embed="rId11" cstate="screen">
+              <a:extLst>
+                <a:ext uri="{28A0092B-C50C-407E-A947-70E740481C1C}">
+                  <a14:useLocalDpi xmlns:a14="http://schemas.microsoft.com/office/drawing/2010/main"/>
+                </a:ext>
+              </a:extLst>
+            </a:blip>
+            <a:srcRect/>
+            <a:stretch>
+              <a:fillRect/>
+            </a:stretch>
+          </p:blipFill>
+          <p:spPr bwMode="auto">
+            <a:xfrm>
+              <a:off x="9045725" y="1755221"/>
+              <a:ext cx="1219969" cy="1218368"/>
+            </a:xfrm>
+            <a:prstGeom prst="rect">
+              <a:avLst/>
+            </a:prstGeom>
+            <a:noFill/>
+            <a:ln>
+              <a:noFill/>
+            </a:ln>
+            <a:extLst>
+              <a:ext uri="{909E8E84-426E-40DD-AFC4-6F175D3DCCD1}">
+                <a14:hiddenFill xmlns:a14="http://schemas.microsoft.com/office/drawing/2010/main">
+                  <a:solidFill>
+                    <a:srgbClr val="FFFFFF"/>
+                  </a:solidFill>
+                </a14:hiddenFill>
+              </a:ext>
+              <a:ext uri="{91240B29-F687-4F45-9708-019B960494DF}">
+                <a14:hiddenLine xmlns:a14="http://schemas.microsoft.com/office/drawing/2010/main" w="9525">
+                  <a:solidFill>
+                    <a:srgbClr val="000000"/>
+                  </a:solidFill>
+                  <a:miter lim="800000"/>
+                  <a:headEnd/>
+                  <a:tailEnd/>
+                </a14:hiddenLine>
+              </a:ext>
+            </a:extLst>
+          </p:spPr>
+        </p:pic>
+        <p:sp>
+          <p:nvSpPr>
+            <p:cNvPr id="25" name="Content Placeholder 2"/>
+            <p:cNvSpPr txBox="1">
+              <a:spLocks/>
+            </p:cNvSpPr>
+            <p:nvPr/>
+          </p:nvSpPr>
+          <p:spPr bwMode="auto">
+            <a:xfrm>
+              <a:off x="8736414" y="2983956"/>
+              <a:ext cx="1828224" cy="552154"/>
+            </a:xfrm>
+            <a:prstGeom prst="rect">
+              <a:avLst/>
+            </a:prstGeom>
+            <a:noFill/>
+            <a:ln>
+              <a:noFill/>
+            </a:ln>
+            <a:extLst>
+              <a:ext uri="{909E8E84-426E-40DD-AFC4-6F175D3DCCD1}">
+                <a14:hiddenFill xmlns:a14="http://schemas.microsoft.com/office/drawing/2010/main">
+                  <a:solidFill>
+                    <a:srgbClr val="FFFFFF"/>
+                  </a:solidFill>
+                </a14:hiddenFill>
+              </a:ext>
+              <a:ext uri="{91240B29-F687-4F45-9708-019B960494DF}">
+                <a14:hiddenLine xmlns:a14="http://schemas.microsoft.com/office/drawing/2010/main" w="9525">
+                  <a:solidFill>
+                    <a:srgbClr val="000000"/>
+                  </a:solidFill>
+                  <a:miter lim="800000"/>
+                  <a:headEnd/>
+                  <a:tailEnd/>
+                </a14:hiddenLine>
+              </a:ext>
+            </a:extLst>
+          </p:spPr>
+          <p:txBody>
+            <a:bodyPr/>
+            <a:lstStyle>
+              <a:lvl1pPr eaLnBrk="0" hangingPunct="0">
+                <a:defRPr sz="2400">
+                  <a:solidFill>
+                    <a:schemeClr val="tx1"/>
+                  </a:solidFill>
+                  <a:latin typeface="Arial" charset="0"/>
+                  <a:ea typeface="ＭＳ Ｐゴシック" charset="0"/>
+                  <a:cs typeface="DejaVu Sans" charset="0"/>
+                </a:defRPr>
+              </a:lvl1pPr>
+              <a:lvl2pPr marL="37931725" indent="-37474525" eaLnBrk="0" hangingPunct="0">
+                <a:defRPr sz="2400">
+                  <a:solidFill>
+                    <a:schemeClr val="tx1"/>
+                  </a:solidFill>
+                  <a:latin typeface="Arial" charset="0"/>
+                  <a:ea typeface="DejaVu Sans" charset="0"/>
+                  <a:cs typeface="DejaVu Sans" charset="0"/>
+                </a:defRPr>
+              </a:lvl2pPr>
+              <a:lvl3pPr eaLnBrk="0" hangingPunct="0">
+                <a:defRPr sz="2400">
+                  <a:solidFill>
+                    <a:schemeClr val="tx1"/>
+                  </a:solidFill>
+                  <a:latin typeface="Arial" charset="0"/>
+                  <a:ea typeface="DejaVu Sans" charset="0"/>
+                  <a:cs typeface="DejaVu Sans" charset="0"/>
+                </a:defRPr>
+              </a:lvl3pPr>
+              <a:lvl4pPr eaLnBrk="0" hangingPunct="0">
+                <a:defRPr sz="2400">
+                  <a:solidFill>
+                    <a:schemeClr val="tx1"/>
+                  </a:solidFill>
+                  <a:latin typeface="Arial" charset="0"/>
+                  <a:ea typeface="DejaVu Sans" charset="0"/>
+                  <a:cs typeface="DejaVu Sans" charset="0"/>
+                </a:defRPr>
+              </a:lvl4pPr>
+              <a:lvl5pPr eaLnBrk="0" hangingPunct="0">
+                <a:defRPr sz="2400">
+                  <a:solidFill>
+                    <a:schemeClr val="tx1"/>
+                  </a:solidFill>
+                  <a:latin typeface="Arial" charset="0"/>
+                  <a:ea typeface="DejaVu Sans" charset="0"/>
+                  <a:cs typeface="DejaVu Sans" charset="0"/>
+                </a:defRPr>
+              </a:lvl5pPr>
+              <a:lvl6pPr marL="457200" eaLnBrk="0" fontAlgn="base" hangingPunct="0">
+                <a:spcBef>
+                  <a:spcPct val="0"/>
+                </a:spcBef>
+                <a:spcAft>
+                  <a:spcPct val="0"/>
+                </a:spcAft>
+                <a:defRPr sz="2400">
+                  <a:solidFill>
+                    <a:schemeClr val="tx1"/>
+                  </a:solidFill>
+                  <a:latin typeface="Arial" charset="0"/>
+                  <a:ea typeface="DejaVu Sans" charset="0"/>
+                  <a:cs typeface="DejaVu Sans" charset="0"/>
+                </a:defRPr>
+              </a:lvl6pPr>
+              <a:lvl7pPr marL="914400" eaLnBrk="0" fontAlgn="base" hangingPunct="0">
+                <a:spcBef>
+                  <a:spcPct val="0"/>
+                </a:spcBef>
+                <a:spcAft>
+                  <a:spcPct val="0"/>
+                </a:spcAft>
+                <a:defRPr sz="2400">
+                  <a:solidFill>
+                    <a:schemeClr val="tx1"/>
+                  </a:solidFill>
+                  <a:latin typeface="Arial" charset="0"/>
+                  <a:ea typeface="DejaVu Sans" charset="0"/>
+                  <a:cs typeface="DejaVu Sans" charset="0"/>
+                </a:defRPr>
+              </a:lvl7pPr>
+              <a:lvl8pPr marL="1371600" eaLnBrk="0" fontAlgn="base" hangingPunct="0">
+                <a:spcBef>
+                  <a:spcPct val="0"/>
+                </a:spcBef>
+                <a:spcAft>
+                  <a:spcPct val="0"/>
+                </a:spcAft>
+                <a:defRPr sz="2400">
+                  <a:solidFill>
+                    <a:schemeClr val="tx1"/>
+                  </a:solidFill>
+                  <a:latin typeface="Arial" charset="0"/>
+                  <a:ea typeface="DejaVu Sans" charset="0"/>
+                  <a:cs typeface="DejaVu Sans" charset="0"/>
+                </a:defRPr>
+              </a:lvl8pPr>
+              <a:lvl9pPr marL="1828800" eaLnBrk="0" fontAlgn="base" hangingPunct="0">
+                <a:spcBef>
+                  <a:spcPct val="0"/>
+                </a:spcBef>
+                <a:spcAft>
+                  <a:spcPct val="0"/>
+                </a:spcAft>
+                <a:defRPr sz="2400">
+                  <a:solidFill>
+                    <a:schemeClr val="tx1"/>
+                  </a:solidFill>
+                  <a:latin typeface="Arial" charset="0"/>
+                  <a:ea typeface="DejaVu Sans" charset="0"/>
+                  <a:cs typeface="DejaVu Sans" charset="0"/>
+                </a:defRPr>
+              </a:lvl9pPr>
+            </a:lstStyle>
+            <a:p>
+              <a:pPr algn="ctr" defTabSz="914400" eaLnBrk="1" hangingPunct="1">
+                <a:buFont typeface="Arial" charset="0"/>
+                <a:buNone/>
+              </a:pPr>
+              <a:r>
+                <a:rPr lang="en-US" sz="1200">
+                  <a:solidFill>
+                    <a:srgbClr val="FF9933"/>
+                  </a:solidFill>
+                </a:rPr>
+                <a:t>Depth Maps</a:t>
+              </a:r>
+            </a:p>
+          </p:txBody>
+        </p:sp>
+        <p:pic>
+          <p:nvPicPr>
+            <p:cNvPr id="26" name="Picture 9"/>
+            <p:cNvPicPr>
+              <a:picLocks noChangeAspect="1" noChangeArrowheads="1"/>
+            </p:cNvPicPr>
+            <p:nvPr/>
+          </p:nvPicPr>
+          <p:blipFill>
+            <a:blip r:embed="rId12" cstate="screen">
+              <a:extLst>
+                <a:ext uri="{28A0092B-C50C-407E-A947-70E740481C1C}">
+                  <a14:useLocalDpi xmlns:a14="http://schemas.microsoft.com/office/drawing/2010/main"/>
+                </a:ext>
+              </a:extLst>
+            </a:blip>
+            <a:srcRect/>
+            <a:stretch>
+              <a:fillRect/>
+            </a:stretch>
+          </p:blipFill>
+          <p:spPr bwMode="auto">
+            <a:xfrm>
+              <a:off x="4451048" y="3622952"/>
+              <a:ext cx="1219968" cy="1207997"/>
+            </a:xfrm>
+            <a:prstGeom prst="rect">
+              <a:avLst/>
+            </a:prstGeom>
+            <a:noFill/>
+            <a:ln>
+              <a:noFill/>
+            </a:ln>
+            <a:extLst>
+              <a:ext uri="{909E8E84-426E-40DD-AFC4-6F175D3DCCD1}">
+                <a14:hiddenFill xmlns:a14="http://schemas.microsoft.com/office/drawing/2010/main">
+                  <a:solidFill>
+                    <a:srgbClr val="FFFFFF"/>
+                  </a:solidFill>
+                </a14:hiddenFill>
+              </a:ext>
+              <a:ext uri="{91240B29-F687-4F45-9708-019B960494DF}">
+                <a14:hiddenLine xmlns:a14="http://schemas.microsoft.com/office/drawing/2010/main" w="9525">
+                  <a:solidFill>
+                    <a:srgbClr val="000000"/>
+                  </a:solidFill>
+                  <a:miter lim="800000"/>
+                  <a:headEnd/>
+                  <a:tailEnd/>
+                </a14:hiddenLine>
+              </a:ext>
+            </a:extLst>
+          </p:spPr>
+        </p:pic>
+        <p:sp>
+          <p:nvSpPr>
+            <p:cNvPr id="27" name="Content Placeholder 2"/>
+            <p:cNvSpPr txBox="1">
+              <a:spLocks/>
+            </p:cNvSpPr>
+            <p:nvPr/>
+          </p:nvSpPr>
+          <p:spPr bwMode="auto">
+            <a:xfrm>
+              <a:off x="5693406" y="4852986"/>
+              <a:ext cx="1828224" cy="552154"/>
+            </a:xfrm>
+            <a:prstGeom prst="rect">
+              <a:avLst/>
+            </a:prstGeom>
+            <a:noFill/>
+            <a:ln>
+              <a:noFill/>
+            </a:ln>
+            <a:extLst>
+              <a:ext uri="{909E8E84-426E-40DD-AFC4-6F175D3DCCD1}">
+                <a14:hiddenFill xmlns:a14="http://schemas.microsoft.com/office/drawing/2010/main">
+                  <a:solidFill>
+                    <a:srgbClr val="FFFFFF"/>
+                  </a:solidFill>
+                </a14:hiddenFill>
+              </a:ext>
+              <a:ext uri="{91240B29-F687-4F45-9708-019B960494DF}">
+                <a14:hiddenLine xmlns:a14="http://schemas.microsoft.com/office/drawing/2010/main" w="9525">
+                  <a:solidFill>
+                    <a:srgbClr val="000000"/>
+                  </a:solidFill>
+                  <a:miter lim="800000"/>
+                  <a:headEnd/>
+                  <a:tailEnd/>
+                </a14:hiddenLine>
+              </a:ext>
+            </a:extLst>
+          </p:spPr>
+          <p:txBody>
+            <a:bodyPr/>
+            <a:lstStyle>
+              <a:lvl1pPr eaLnBrk="0" hangingPunct="0">
+                <a:defRPr sz="2400">
+                  <a:solidFill>
+                    <a:schemeClr val="tx1"/>
+                  </a:solidFill>
+                  <a:latin typeface="Arial" charset="0"/>
+                  <a:ea typeface="ＭＳ Ｐゴシック" charset="0"/>
+                  <a:cs typeface="DejaVu Sans" charset="0"/>
+                </a:defRPr>
+              </a:lvl1pPr>
+              <a:lvl2pPr marL="37931725" indent="-37474525" eaLnBrk="0" hangingPunct="0">
+                <a:defRPr sz="2400">
+                  <a:solidFill>
+                    <a:schemeClr val="tx1"/>
+                  </a:solidFill>
+                  <a:latin typeface="Arial" charset="0"/>
+                  <a:ea typeface="DejaVu Sans" charset="0"/>
+                  <a:cs typeface="DejaVu Sans" charset="0"/>
+                </a:defRPr>
+              </a:lvl2pPr>
+              <a:lvl3pPr eaLnBrk="0" hangingPunct="0">
+                <a:defRPr sz="2400">
+                  <a:solidFill>
+                    <a:schemeClr val="tx1"/>
+                  </a:solidFill>
+                  <a:latin typeface="Arial" charset="0"/>
+                  <a:ea typeface="DejaVu Sans" charset="0"/>
+                  <a:cs typeface="DejaVu Sans" charset="0"/>
+                </a:defRPr>
+              </a:lvl3pPr>
+              <a:lvl4pPr eaLnBrk="0" hangingPunct="0">
+                <a:defRPr sz="2400">
+                  <a:solidFill>
+                    <a:schemeClr val="tx1"/>
+                  </a:solidFill>
+                  <a:latin typeface="Arial" charset="0"/>
+                  <a:ea typeface="DejaVu Sans" charset="0"/>
+                  <a:cs typeface="DejaVu Sans" charset="0"/>
+                </a:defRPr>
+              </a:lvl4pPr>
+              <a:lvl5pPr eaLnBrk="0" hangingPunct="0">
+                <a:defRPr sz="2400">
+                  <a:solidFill>
+                    <a:schemeClr val="tx1"/>
+                  </a:solidFill>
+                  <a:latin typeface="Arial" charset="0"/>
+                  <a:ea typeface="DejaVu Sans" charset="0"/>
+                  <a:cs typeface="DejaVu Sans" charset="0"/>
+                </a:defRPr>
+              </a:lvl5pPr>
+              <a:lvl6pPr marL="457200" eaLnBrk="0" fontAlgn="base" hangingPunct="0">
+                <a:spcBef>
+                  <a:spcPct val="0"/>
+                </a:spcBef>
+                <a:spcAft>
+                  <a:spcPct val="0"/>
+                </a:spcAft>
+                <a:defRPr sz="2400">
+                  <a:solidFill>
+                    <a:schemeClr val="tx1"/>
+                  </a:solidFill>
+                  <a:latin typeface="Arial" charset="0"/>
+                  <a:ea typeface="DejaVu Sans" charset="0"/>
+                  <a:cs typeface="DejaVu Sans" charset="0"/>
+                </a:defRPr>
+              </a:lvl6pPr>
+              <a:lvl7pPr marL="914400" eaLnBrk="0" fontAlgn="base" hangingPunct="0">
+                <a:spcBef>
+                  <a:spcPct val="0"/>
+                </a:spcBef>
+                <a:spcAft>
+                  <a:spcPct val="0"/>
+                </a:spcAft>
+                <a:defRPr sz="2400">
+                  <a:solidFill>
+                    <a:schemeClr val="tx1"/>
+                  </a:solidFill>
+                  <a:latin typeface="Arial" charset="0"/>
+                  <a:ea typeface="DejaVu Sans" charset="0"/>
+                  <a:cs typeface="DejaVu Sans" charset="0"/>
+                </a:defRPr>
+              </a:lvl7pPr>
+              <a:lvl8pPr marL="1371600" eaLnBrk="0" fontAlgn="base" hangingPunct="0">
+                <a:spcBef>
+                  <a:spcPct val="0"/>
+                </a:spcBef>
+                <a:spcAft>
+                  <a:spcPct val="0"/>
+                </a:spcAft>
+                <a:defRPr sz="2400">
+                  <a:solidFill>
+                    <a:schemeClr val="tx1"/>
+                  </a:solidFill>
+                  <a:latin typeface="Arial" charset="0"/>
+                  <a:ea typeface="DejaVu Sans" charset="0"/>
+                  <a:cs typeface="DejaVu Sans" charset="0"/>
+                </a:defRPr>
+              </a:lvl8pPr>
+              <a:lvl9pPr marL="1828800" eaLnBrk="0" fontAlgn="base" hangingPunct="0">
+                <a:spcBef>
+                  <a:spcPct val="0"/>
+                </a:spcBef>
+                <a:spcAft>
+                  <a:spcPct val="0"/>
+                </a:spcAft>
+                <a:defRPr sz="2400">
+                  <a:solidFill>
+                    <a:schemeClr val="tx1"/>
+                  </a:solidFill>
+                  <a:latin typeface="Arial" charset="0"/>
+                  <a:ea typeface="DejaVu Sans" charset="0"/>
+                  <a:cs typeface="DejaVu Sans" charset="0"/>
+                </a:defRPr>
+              </a:lvl9pPr>
+            </a:lstStyle>
+            <a:p>
+              <a:pPr algn="ctr" defTabSz="914400" eaLnBrk="1" hangingPunct="1">
+                <a:buFont typeface="Arial" charset="0"/>
+                <a:buNone/>
+              </a:pPr>
+              <a:r>
+                <a:rPr lang="en-US" sz="1200">
+                  <a:solidFill>
+                    <a:srgbClr val="FF9933"/>
+                  </a:solidFill>
+                </a:rPr>
+                <a:t>Optical Flow</a:t>
+              </a:r>
+            </a:p>
+          </p:txBody>
+        </p:sp>
+        <p:pic>
+          <p:nvPicPr>
+            <p:cNvPr id="28" name="Picture 10"/>
+            <p:cNvPicPr>
+              <a:picLocks noChangeAspect="1" noChangeArrowheads="1"/>
+            </p:cNvPicPr>
+            <p:nvPr/>
+          </p:nvPicPr>
+          <p:blipFill>
+            <a:blip r:embed="rId13" cstate="screen">
+              <a:extLst>
+                <a:ext uri="{28A0092B-C50C-407E-A947-70E740481C1C}">
+                  <a14:useLocalDpi xmlns:a14="http://schemas.microsoft.com/office/drawing/2010/main"/>
+                </a:ext>
+              </a:extLst>
+            </a:blip>
+            <a:srcRect/>
+            <a:stretch>
+              <a:fillRect/>
+            </a:stretch>
+          </p:blipFill>
+          <p:spPr bwMode="auto">
+            <a:xfrm>
+              <a:off x="7521630" y="3622952"/>
+              <a:ext cx="1219968" cy="1207997"/>
+            </a:xfrm>
+            <a:prstGeom prst="rect">
+              <a:avLst/>
+            </a:prstGeom>
+            <a:noFill/>
+            <a:ln>
+              <a:noFill/>
+            </a:ln>
+            <a:extLst>
+              <a:ext uri="{909E8E84-426E-40DD-AFC4-6F175D3DCCD1}">
+                <a14:hiddenFill xmlns:a14="http://schemas.microsoft.com/office/drawing/2010/main">
+                  <a:solidFill>
+                    <a:srgbClr val="FFFFFF"/>
+                  </a:solidFill>
+                </a14:hiddenFill>
+              </a:ext>
+              <a:ext uri="{91240B29-F687-4F45-9708-019B960494DF}">
+                <a14:hiddenLine xmlns:a14="http://schemas.microsoft.com/office/drawing/2010/main" w="9525">
+                  <a:solidFill>
+                    <a:srgbClr val="000000"/>
+                  </a:solidFill>
+                  <a:miter lim="800000"/>
+                  <a:headEnd/>
+                  <a:tailEnd/>
+                </a14:hiddenLine>
+              </a:ext>
+            </a:extLst>
+          </p:spPr>
+        </p:pic>
+        <p:sp>
+          <p:nvSpPr>
+            <p:cNvPr id="29" name="Content Placeholder 2"/>
+            <p:cNvSpPr txBox="1">
+              <a:spLocks/>
+            </p:cNvSpPr>
+            <p:nvPr/>
+          </p:nvSpPr>
+          <p:spPr bwMode="auto">
+            <a:xfrm>
+              <a:off x="7217502" y="4863356"/>
+              <a:ext cx="1828224" cy="552154"/>
+            </a:xfrm>
+            <a:prstGeom prst="rect">
+              <a:avLst/>
+            </a:prstGeom>
+            <a:noFill/>
+            <a:ln>
+              <a:noFill/>
+            </a:ln>
+            <a:extLst>
+              <a:ext uri="{909E8E84-426E-40DD-AFC4-6F175D3DCCD1}">
+                <a14:hiddenFill xmlns:a14="http://schemas.microsoft.com/office/drawing/2010/main">
+                  <a:solidFill>
+                    <a:srgbClr val="FFFFFF"/>
+                  </a:solidFill>
+                </a14:hiddenFill>
+              </a:ext>
+              <a:ext uri="{91240B29-F687-4F45-9708-019B960494DF}">
+                <a14:hiddenLine xmlns:a14="http://schemas.microsoft.com/office/drawing/2010/main" w="9525">
+                  <a:solidFill>
+                    <a:srgbClr val="000000"/>
+                  </a:solidFill>
+                  <a:miter lim="800000"/>
+                  <a:headEnd/>
+                  <a:tailEnd/>
+                </a14:hiddenLine>
+              </a:ext>
+            </a:extLst>
+          </p:spPr>
+          <p:txBody>
+            <a:bodyPr/>
+            <a:lstStyle>
+              <a:lvl1pPr eaLnBrk="0" hangingPunct="0">
+                <a:defRPr sz="2400">
+                  <a:solidFill>
+                    <a:schemeClr val="tx1"/>
+                  </a:solidFill>
+                  <a:latin typeface="Arial" charset="0"/>
+                  <a:ea typeface="ＭＳ Ｐゴシック" charset="0"/>
+                  <a:cs typeface="DejaVu Sans" charset="0"/>
+                </a:defRPr>
+              </a:lvl1pPr>
+              <a:lvl2pPr marL="37931725" indent="-37474525" eaLnBrk="0" hangingPunct="0">
+                <a:defRPr sz="2400">
+                  <a:solidFill>
+                    <a:schemeClr val="tx1"/>
+                  </a:solidFill>
+                  <a:latin typeface="Arial" charset="0"/>
+                  <a:ea typeface="DejaVu Sans" charset="0"/>
+                  <a:cs typeface="DejaVu Sans" charset="0"/>
+                </a:defRPr>
+              </a:lvl2pPr>
+              <a:lvl3pPr eaLnBrk="0" hangingPunct="0">
+                <a:defRPr sz="2400">
+                  <a:solidFill>
+                    <a:schemeClr val="tx1"/>
+                  </a:solidFill>
+                  <a:latin typeface="Arial" charset="0"/>
+                  <a:ea typeface="DejaVu Sans" charset="0"/>
+                  <a:cs typeface="DejaVu Sans" charset="0"/>
+                </a:defRPr>
+              </a:lvl3pPr>
+              <a:lvl4pPr eaLnBrk="0" hangingPunct="0">
+                <a:defRPr sz="2400">
+                  <a:solidFill>
+                    <a:schemeClr val="tx1"/>
+                  </a:solidFill>
+                  <a:latin typeface="Arial" charset="0"/>
+                  <a:ea typeface="DejaVu Sans" charset="0"/>
+                  <a:cs typeface="DejaVu Sans" charset="0"/>
+                </a:defRPr>
+              </a:lvl4pPr>
+              <a:lvl5pPr eaLnBrk="0" hangingPunct="0">
+                <a:defRPr sz="2400">
+                  <a:solidFill>
+                    <a:schemeClr val="tx1"/>
+                  </a:solidFill>
+                  <a:latin typeface="Arial" charset="0"/>
+                  <a:ea typeface="DejaVu Sans" charset="0"/>
+                  <a:cs typeface="DejaVu Sans" charset="0"/>
+                </a:defRPr>
+              </a:lvl5pPr>
+              <a:lvl6pPr marL="457200" eaLnBrk="0" fontAlgn="base" hangingPunct="0">
+                <a:spcBef>
+                  <a:spcPct val="0"/>
+                </a:spcBef>
+                <a:spcAft>
+                  <a:spcPct val="0"/>
+                </a:spcAft>
+                <a:defRPr sz="2400">
+                  <a:solidFill>
+                    <a:schemeClr val="tx1"/>
+                  </a:solidFill>
+                  <a:latin typeface="Arial" charset="0"/>
+                  <a:ea typeface="DejaVu Sans" charset="0"/>
+                  <a:cs typeface="DejaVu Sans" charset="0"/>
+                </a:defRPr>
+              </a:lvl6pPr>
+              <a:lvl7pPr marL="914400" eaLnBrk="0" fontAlgn="base" hangingPunct="0">
+                <a:spcBef>
+                  <a:spcPct val="0"/>
+                </a:spcBef>
+                <a:spcAft>
+                  <a:spcPct val="0"/>
+                </a:spcAft>
+                <a:defRPr sz="2400">
+                  <a:solidFill>
+                    <a:schemeClr val="tx1"/>
+                  </a:solidFill>
+                  <a:latin typeface="Arial" charset="0"/>
+                  <a:ea typeface="DejaVu Sans" charset="0"/>
+                  <a:cs typeface="DejaVu Sans" charset="0"/>
+                </a:defRPr>
+              </a:lvl7pPr>
+              <a:lvl8pPr marL="1371600" eaLnBrk="0" fontAlgn="base" hangingPunct="0">
+                <a:spcBef>
+                  <a:spcPct val="0"/>
+                </a:spcBef>
+                <a:spcAft>
+                  <a:spcPct val="0"/>
+                </a:spcAft>
+                <a:defRPr sz="2400">
+                  <a:solidFill>
+                    <a:schemeClr val="tx1"/>
+                  </a:solidFill>
+                  <a:latin typeface="Arial" charset="0"/>
+                  <a:ea typeface="DejaVu Sans" charset="0"/>
+                  <a:cs typeface="DejaVu Sans" charset="0"/>
+                </a:defRPr>
+              </a:lvl8pPr>
+              <a:lvl9pPr marL="1828800" eaLnBrk="0" fontAlgn="base" hangingPunct="0">
+                <a:spcBef>
+                  <a:spcPct val="0"/>
+                </a:spcBef>
+                <a:spcAft>
+                  <a:spcPct val="0"/>
+                </a:spcAft>
+                <a:defRPr sz="2400">
+                  <a:solidFill>
+                    <a:schemeClr val="tx1"/>
+                  </a:solidFill>
+                  <a:latin typeface="Arial" charset="0"/>
+                  <a:ea typeface="DejaVu Sans" charset="0"/>
+                  <a:cs typeface="DejaVu Sans" charset="0"/>
+                </a:defRPr>
+              </a:lvl9pPr>
+            </a:lstStyle>
+            <a:p>
+              <a:pPr algn="ctr" defTabSz="914400" eaLnBrk="1" hangingPunct="1">
+                <a:buFont typeface="Arial" charset="0"/>
+                <a:buNone/>
+              </a:pPr>
+              <a:r>
+                <a:rPr lang="en-US" sz="1200">
+                  <a:solidFill>
+                    <a:srgbClr val="FF9933"/>
+                  </a:solidFill>
+                </a:rPr>
+                <a:t>Inpainting</a:t>
+              </a:r>
+            </a:p>
+          </p:txBody>
+        </p:sp>
+        <p:sp>
+          <p:nvSpPr>
+            <p:cNvPr id="30" name="Content Placeholder 2"/>
+            <p:cNvSpPr txBox="1">
+              <a:spLocks/>
+            </p:cNvSpPr>
+            <p:nvPr/>
+          </p:nvSpPr>
+          <p:spPr bwMode="auto">
+            <a:xfrm>
+              <a:off x="8741598" y="4843914"/>
+              <a:ext cx="1828224" cy="552154"/>
+            </a:xfrm>
+            <a:prstGeom prst="rect">
+              <a:avLst/>
+            </a:prstGeom>
+            <a:noFill/>
+            <a:ln>
+              <a:noFill/>
+            </a:ln>
+            <a:extLst>
+              <a:ext uri="{909E8E84-426E-40DD-AFC4-6F175D3DCCD1}">
+                <a14:hiddenFill xmlns:a14="http://schemas.microsoft.com/office/drawing/2010/main">
+                  <a:solidFill>
+                    <a:srgbClr val="FFFFFF"/>
+                  </a:solidFill>
+                </a14:hiddenFill>
+              </a:ext>
+              <a:ext uri="{91240B29-F687-4F45-9708-019B960494DF}">
+                <a14:hiddenLine xmlns:a14="http://schemas.microsoft.com/office/drawing/2010/main" w="9525">
+                  <a:solidFill>
+                    <a:srgbClr val="000000"/>
+                  </a:solidFill>
+                  <a:miter lim="800000"/>
+                  <a:headEnd/>
+                  <a:tailEnd/>
+                </a14:hiddenLine>
+              </a:ext>
+            </a:extLst>
+          </p:spPr>
+          <p:txBody>
+            <a:bodyPr/>
+            <a:lstStyle>
+              <a:lvl1pPr eaLnBrk="0" hangingPunct="0">
+                <a:defRPr sz="2400">
+                  <a:solidFill>
+                    <a:schemeClr val="tx1"/>
+                  </a:solidFill>
+                  <a:latin typeface="Arial" charset="0"/>
+                  <a:ea typeface="ＭＳ Ｐゴシック" charset="0"/>
+                  <a:cs typeface="DejaVu Sans" charset="0"/>
+                </a:defRPr>
+              </a:lvl1pPr>
+              <a:lvl2pPr marL="37931725" indent="-37474525" eaLnBrk="0" hangingPunct="0">
+                <a:defRPr sz="2400">
+                  <a:solidFill>
+                    <a:schemeClr val="tx1"/>
+                  </a:solidFill>
+                  <a:latin typeface="Arial" charset="0"/>
+                  <a:ea typeface="DejaVu Sans" charset="0"/>
+                  <a:cs typeface="DejaVu Sans" charset="0"/>
+                </a:defRPr>
+              </a:lvl2pPr>
+              <a:lvl3pPr eaLnBrk="0" hangingPunct="0">
+                <a:defRPr sz="2400">
+                  <a:solidFill>
+                    <a:schemeClr val="tx1"/>
+                  </a:solidFill>
+                  <a:latin typeface="Arial" charset="0"/>
+                  <a:ea typeface="DejaVu Sans" charset="0"/>
+                  <a:cs typeface="DejaVu Sans" charset="0"/>
+                </a:defRPr>
+              </a:lvl3pPr>
+              <a:lvl4pPr eaLnBrk="0" hangingPunct="0">
+                <a:defRPr sz="2400">
+                  <a:solidFill>
+                    <a:schemeClr val="tx1"/>
+                  </a:solidFill>
+                  <a:latin typeface="Arial" charset="0"/>
+                  <a:ea typeface="DejaVu Sans" charset="0"/>
+                  <a:cs typeface="DejaVu Sans" charset="0"/>
+                </a:defRPr>
+              </a:lvl4pPr>
+              <a:lvl5pPr eaLnBrk="0" hangingPunct="0">
+                <a:defRPr sz="2400">
+                  <a:solidFill>
+                    <a:schemeClr val="tx1"/>
+                  </a:solidFill>
+                  <a:latin typeface="Arial" charset="0"/>
+                  <a:ea typeface="DejaVu Sans" charset="0"/>
+                  <a:cs typeface="DejaVu Sans" charset="0"/>
+                </a:defRPr>
+              </a:lvl5pPr>
+              <a:lvl6pPr marL="457200" eaLnBrk="0" fontAlgn="base" hangingPunct="0">
+                <a:spcBef>
+                  <a:spcPct val="0"/>
+                </a:spcBef>
+                <a:spcAft>
+                  <a:spcPct val="0"/>
+                </a:spcAft>
+                <a:defRPr sz="2400">
+                  <a:solidFill>
+                    <a:schemeClr val="tx1"/>
+                  </a:solidFill>
+                  <a:latin typeface="Arial" charset="0"/>
+                  <a:ea typeface="DejaVu Sans" charset="0"/>
+                  <a:cs typeface="DejaVu Sans" charset="0"/>
+                </a:defRPr>
+              </a:lvl6pPr>
+              <a:lvl7pPr marL="914400" eaLnBrk="0" fontAlgn="base" hangingPunct="0">
+                <a:spcBef>
+                  <a:spcPct val="0"/>
+                </a:spcBef>
+                <a:spcAft>
+                  <a:spcPct val="0"/>
+                </a:spcAft>
+                <a:defRPr sz="2400">
+                  <a:solidFill>
+                    <a:schemeClr val="tx1"/>
+                  </a:solidFill>
+                  <a:latin typeface="Arial" charset="0"/>
+                  <a:ea typeface="DejaVu Sans" charset="0"/>
+                  <a:cs typeface="DejaVu Sans" charset="0"/>
+                </a:defRPr>
+              </a:lvl7pPr>
+              <a:lvl8pPr marL="1371600" eaLnBrk="0" fontAlgn="base" hangingPunct="0">
+                <a:spcBef>
+                  <a:spcPct val="0"/>
+                </a:spcBef>
+                <a:spcAft>
+                  <a:spcPct val="0"/>
+                </a:spcAft>
+                <a:defRPr sz="2400">
+                  <a:solidFill>
+                    <a:schemeClr val="tx1"/>
+                  </a:solidFill>
+                  <a:latin typeface="Arial" charset="0"/>
+                  <a:ea typeface="DejaVu Sans" charset="0"/>
+                  <a:cs typeface="DejaVu Sans" charset="0"/>
+                </a:defRPr>
+              </a:lvl8pPr>
+              <a:lvl9pPr marL="1828800" eaLnBrk="0" fontAlgn="base" hangingPunct="0">
+                <a:spcBef>
+                  <a:spcPct val="0"/>
+                </a:spcBef>
+                <a:spcAft>
+                  <a:spcPct val="0"/>
+                </a:spcAft>
+                <a:defRPr sz="2400">
+                  <a:solidFill>
+                    <a:schemeClr val="tx1"/>
+                  </a:solidFill>
+                  <a:latin typeface="Arial" charset="0"/>
+                  <a:ea typeface="DejaVu Sans" charset="0"/>
+                  <a:cs typeface="DejaVu Sans" charset="0"/>
+                </a:defRPr>
+              </a:lvl9pPr>
+            </a:lstStyle>
+            <a:p>
+              <a:pPr algn="ctr" defTabSz="914400" eaLnBrk="1" hangingPunct="1">
+                <a:buFont typeface="Arial" charset="0"/>
+                <a:buNone/>
+              </a:pPr>
+              <a:r>
+                <a:rPr lang="en-US" sz="1200">
+                  <a:solidFill>
+                    <a:srgbClr val="FF9933"/>
+                  </a:solidFill>
+                </a:rPr>
+                <a:t>Tracking</a:t>
+              </a:r>
+            </a:p>
+          </p:txBody>
+        </p:sp>
+        <p:pic>
+          <p:nvPicPr>
+            <p:cNvPr id="31" name="Picture 12"/>
+            <p:cNvPicPr>
+              <a:picLocks noChangeAspect="1" noChangeArrowheads="1"/>
+            </p:cNvPicPr>
+            <p:nvPr/>
+          </p:nvPicPr>
+          <p:blipFill>
+            <a:blip r:embed="rId14" cstate="screen">
+              <a:extLst>
+                <a:ext uri="{28A0092B-C50C-407E-A947-70E740481C1C}">
+                  <a14:useLocalDpi xmlns:a14="http://schemas.microsoft.com/office/drawing/2010/main"/>
+                </a:ext>
+              </a:extLst>
+            </a:blip>
+            <a:srcRect/>
+            <a:stretch>
+              <a:fillRect/>
+            </a:stretch>
+          </p:blipFill>
+          <p:spPr bwMode="auto">
+            <a:xfrm>
+              <a:off x="5995805" y="3621656"/>
+              <a:ext cx="1221697" cy="1209294"/>
+            </a:xfrm>
+            <a:prstGeom prst="rect">
+              <a:avLst/>
+            </a:prstGeom>
+            <a:noFill/>
+            <a:ln>
+              <a:noFill/>
+            </a:ln>
+            <a:extLst>
+              <a:ext uri="{909E8E84-426E-40DD-AFC4-6F175D3DCCD1}">
+                <a14:hiddenFill xmlns:a14="http://schemas.microsoft.com/office/drawing/2010/main">
+                  <a:solidFill>
+                    <a:srgbClr val="FFFFFF"/>
+                  </a:solidFill>
+                </a14:hiddenFill>
+              </a:ext>
+              <a:ext uri="{91240B29-F687-4F45-9708-019B960494DF}">
+                <a14:hiddenLine xmlns:a14="http://schemas.microsoft.com/office/drawing/2010/main" w="9525">
+                  <a:solidFill>
+                    <a:srgbClr val="000000"/>
+                  </a:solidFill>
+                  <a:miter lim="800000"/>
+                  <a:headEnd/>
+                  <a:tailEnd/>
+                </a14:hiddenLine>
+              </a:ext>
+            </a:extLst>
+          </p:spPr>
+        </p:pic>
+        <p:pic>
+          <p:nvPicPr>
+            <p:cNvPr id="32" name="Picture 14"/>
+            <p:cNvPicPr>
+              <a:picLocks noChangeAspect="1" noChangeArrowheads="1"/>
+            </p:cNvPicPr>
+            <p:nvPr/>
+          </p:nvPicPr>
+          <p:blipFill>
+            <a:blip r:embed="rId15" cstate="screen">
+              <a:extLst>
+                <a:ext uri="{28A0092B-C50C-407E-A947-70E740481C1C}">
+                  <a14:useLocalDpi xmlns:a14="http://schemas.microsoft.com/office/drawing/2010/main"/>
+                </a:ext>
+              </a:extLst>
+            </a:blip>
+            <a:srcRect/>
+            <a:stretch>
+              <a:fillRect/>
+            </a:stretch>
+          </p:blipFill>
+          <p:spPr bwMode="auto">
+            <a:xfrm>
+              <a:off x="9043997" y="3622955"/>
+              <a:ext cx="1221697" cy="1207996"/>
+            </a:xfrm>
+            <a:prstGeom prst="rect">
+              <a:avLst/>
+            </a:prstGeom>
+            <a:noFill/>
+            <a:ln>
+              <a:noFill/>
+            </a:ln>
+            <a:extLst>
+              <a:ext uri="{909E8E84-426E-40DD-AFC4-6F175D3DCCD1}">
+                <a14:hiddenFill xmlns:a14="http://schemas.microsoft.com/office/drawing/2010/main">
+                  <a:solidFill>
+                    <a:srgbClr val="FFFFFF"/>
+                  </a:solidFill>
+                </a14:hiddenFill>
+              </a:ext>
+              <a:ext uri="{91240B29-F687-4F45-9708-019B960494DF}">
+                <a14:hiddenLine xmlns:a14="http://schemas.microsoft.com/office/drawing/2010/main" w="9525">
+                  <a:solidFill>
+                    <a:srgbClr val="000000"/>
+                  </a:solidFill>
+                  <a:miter lim="800000"/>
+                  <a:headEnd/>
+                  <a:tailEnd/>
+                </a14:hiddenLine>
+              </a:ext>
+            </a:extLst>
+          </p:spPr>
+        </p:pic>
+      </p:grpSp>
+    </p:spTree>
+    <p:extLst>
+      <p:ext uri="{BB962C8B-B14F-4D97-AF65-F5344CB8AC3E}">
+        <p14:creationId xmlns:p14="http://schemas.microsoft.com/office/powerpoint/2010/main" val="844692393"/>
+      </p:ext>
+    </p:extLst>
+  </p:cSld>
+  <p:clrMapOvr>
+    <a:masterClrMapping/>
+  </p:clrMapOvr>
+  <mc:AlternateContent xmlns:mc="http://schemas.openxmlformats.org/markup-compatibility/2006" xmlns:p14="http://schemas.microsoft.com/office/powerpoint/2010/main">
+    <mc:Choice Requires="p14">
+      <p:transition spd="med" p14:dur="700">
+        <p:fade/>
+      </p:transition>
+    </mc:Choice>
+    <mc:Fallback xmlns="">
+      <p:transition spd="med">
+        <p:fade/>
+      </p:transition>
+    </mc:Fallback>
+  </mc:AlternateContent>
+  <p:timing>
+    <p:tnLst>
+      <p:par>
+        <p:cTn id="1" dur="indefinite" restart="never" nodeType="tmRoot"/>
+      </p:par>
+    </p:tnLst>
+  </p:timing>
+</p:sld>
+</file>
+
+<file path=ppt/slides/slide15.xml><?xml version="1.0" encoding="utf-8"?>
 <p:sld xmlns:a="http://schemas.openxmlformats.org/drawingml/2006/main" xmlns:r="http://schemas.openxmlformats.org/officeDocument/2006/relationships" xmlns:p="http://schemas.openxmlformats.org/presentationml/2006/main">
   <p:cSld>
     <p:spTree>
@@ -9963,7 +13431,7 @@
 </p:sld>
 </file>
 
-<file path=ppt/slides/slide15.xml><?xml version="1.0" encoding="utf-8"?>
+<file path=ppt/slides/slide16.xml><?xml version="1.0" encoding="utf-8"?>
 <p:sld xmlns:a="http://schemas.openxmlformats.org/drawingml/2006/main" xmlns:r="http://schemas.openxmlformats.org/officeDocument/2006/relationships" xmlns:p="http://schemas.openxmlformats.org/presentationml/2006/main">
   <p:cSld>
     <p:spTree>
@@ -10668,7 +14136,7 @@
 </p:sld>
 </file>
 
-<file path=ppt/slides/slide16.xml><?xml version="1.0" encoding="utf-8"?>
+<file path=ppt/slides/slide17.xml><?xml version="1.0" encoding="utf-8"?>
 <p:sld xmlns:a="http://schemas.openxmlformats.org/drawingml/2006/main" xmlns:r="http://schemas.openxmlformats.org/officeDocument/2006/relationships" xmlns:p="http://schemas.openxmlformats.org/presentationml/2006/main">
   <p:cSld>
     <p:spTree>
@@ -11176,7 +14644,7 @@
 </p:sld>
 </file>
 
-<file path=ppt/slides/slide17.xml><?xml version="1.0" encoding="utf-8"?>
+<file path=ppt/slides/slide18.xml><?xml version="1.0" encoding="utf-8"?>
 <p:sld xmlns:a="http://schemas.openxmlformats.org/drawingml/2006/main" xmlns:r="http://schemas.openxmlformats.org/officeDocument/2006/relationships" xmlns:p="http://schemas.openxmlformats.org/presentationml/2006/main">
   <p:cSld>
     <p:spTree>
@@ -11736,11 +15204,7 @@
             </a:r>
             <a:r>
               <a:rPr lang="zh-CN" altLang="en-US" sz="3200" dirty="0" smtClean="0"/>
-              <a:t>安装与</a:t>
-            </a:r>
-            <a:r>
-              <a:rPr lang="zh-CN" altLang="en-US" sz="3200" dirty="0" smtClean="0"/>
-              <a:t>配置</a:t>
+              <a:t>安装与配置</a:t>
             </a:r>
             <a:endParaRPr lang="en-US" altLang="zh-CN" sz="3200" dirty="0" smtClean="0"/>
           </a:p>
@@ -13792,11 +17256,7 @@
             <a:pPr lvl="1"/>
             <a:r>
               <a:rPr lang="zh-CN" altLang="en-US" sz="2800" dirty="0" smtClean="0"/>
-              <a:t>图像处理</a:t>
-            </a:r>
-            <a:r>
-              <a:rPr lang="zh-CN" altLang="en-US" sz="2800" dirty="0" smtClean="0"/>
-              <a:t>，解密，高性能</a:t>
+              <a:t>图像处理，解密，高性能</a:t>
             </a:r>
             <a:endParaRPr lang="en-US" altLang="zh-CN" sz="2800" dirty="0"/>
           </a:p>
@@ -13805,7 +17265,6 @@
               <a:rPr lang="en-US" altLang="zh-CN" sz="3200" dirty="0" smtClean="0"/>
               <a:t>COM Express</a:t>
             </a:r>
-            <a:endParaRPr lang="en-US" altLang="zh-CN" sz="3200" dirty="0" smtClean="0"/>
           </a:p>
           <a:p>
             <a:pPr lvl="1"/>
@@ -16496,7 +19955,6 @@
               <a:rPr lang="en-US" altLang="zh-CN" sz="3200" dirty="0" smtClean="0"/>
               <a:t> </a:t>
             </a:r>
-            <a:endParaRPr lang="en-US" altLang="zh-CN" sz="3200" dirty="0" smtClean="0"/>
           </a:p>
           <a:p>
             <a:pPr lvl="1"/>
@@ -17959,17 +21417,12 @@
             <a:pPr defTabSz="457056"/>
             <a:r>
               <a:rPr lang="zh-CN" altLang="en-US" sz="3200" dirty="0" smtClean="0"/>
-              <a:t>运行</a:t>
-            </a:r>
-            <a:r>
-              <a:rPr lang="zh-CN" altLang="en-US" sz="3200" dirty="0" smtClean="0"/>
-              <a:t>测试</a:t>
+              <a:t>运行测试</a:t>
             </a:r>
             <a:r>
               <a:rPr lang="en-US" altLang="zh-CN" sz="3200" dirty="0" smtClean="0"/>
               <a:t> </a:t>
             </a:r>
-            <a:endParaRPr lang="en-US" altLang="zh-CN" sz="3200" dirty="0" smtClean="0"/>
           </a:p>
           <a:p>
             <a:pPr lvl="1"/>
@@ -18996,13 +22449,8 @@
             </a:r>
             <a:r>
               <a:rPr lang="en-US" altLang="zh-CN" sz="3200" dirty="0" smtClean="0"/>
-              <a:t>DEMO</a:t>
-            </a:r>
-            <a:r>
-              <a:rPr lang="en-US" altLang="zh-CN" sz="3200" dirty="0" smtClean="0"/>
-              <a:t> </a:t>
-            </a:r>
-            <a:endParaRPr lang="en-US" altLang="zh-CN" sz="3200" dirty="0" smtClean="0"/>
+              <a:t>DEMO </a:t>
+            </a:r>
           </a:p>
           <a:p>
             <a:pPr lvl="1"/>
@@ -21200,6 +24648,21 @@
 </file>
 
 <file path=customXml/item1.xml><?xml version="1.0" encoding="utf-8"?>
+<p:properties xmlns:p="http://schemas.microsoft.com/office/2006/metadata/properties" xmlns:xsi="http://www.w3.org/2001/XMLSchema-instance">
+  <documentManagement/>
+</p:properties>
+</file>
+
+<file path=customXml/item2.xml><?xml version="1.0" encoding="utf-8"?>
+<?mso-contentType ?>
+<FormTemplates xmlns="http://schemas.microsoft.com/sharepoint/v3/contenttype/forms">
+  <Display>DocumentLibraryForm</Display>
+  <Edit>DocumentLibraryForm</Edit>
+  <New>DocumentLibraryForm</New>
+</FormTemplates>
+</file>
+
+<file path=customXml/item3.xml><?xml version="1.0" encoding="utf-8"?>
 <ct:contentTypeSchema xmlns:ct="http://schemas.microsoft.com/office/2006/metadata/contentType" xmlns:ma="http://schemas.microsoft.com/office/2006/metadata/properties/metaAttributes" ct:_="" ma:_="" ma:contentTypeName="Document" ma:contentTypeID="0x010100FB38B0B4E3072D428564024F6E85BC07" ma:contentTypeVersion="0" ma:contentTypeDescription="Create a new document." ma:contentTypeScope="" ma:versionID="a559b02ab7d86624fa1c6ada0e69e3cd">
   <xsd:schema xmlns:xsd="http://www.w3.org/2001/XMLSchema" xmlns:p="http://schemas.microsoft.com/office/2006/metadata/properties" targetNamespace="http://schemas.microsoft.com/office/2006/metadata/properties" ma:root="true" ma:fieldsID="4aeb20c0e3442673af7ee10786458764">
     <xsd:element name="properties">
@@ -21248,32 +24711,16 @@
 </ct:contentTypeSchema>
 </file>
 
-<file path=customXml/item2.xml><?xml version="1.0" encoding="utf-8"?>
-<?mso-contentType ?>
-<FormTemplates xmlns="http://schemas.microsoft.com/sharepoint/v3/contenttype/forms">
-  <Display>DocumentLibraryForm</Display>
-  <Edit>DocumentLibraryForm</Edit>
-  <New>DocumentLibraryForm</New>
-</FormTemplates>
-</file>
-
-<file path=customXml/item3.xml><?xml version="1.0" encoding="utf-8"?>
-<p:properties xmlns:p="http://schemas.microsoft.com/office/2006/metadata/properties" xmlns:xsi="http://www.w3.org/2001/XMLSchema-instance">
-  <documentManagement/>
-</p:properties>
-</file>
-
 <file path=customXml/itemProps1.xml><?xml version="1.0" encoding="utf-8"?>
-<ds:datastoreItem xmlns:ds="http://schemas.openxmlformats.org/officeDocument/2006/customXml" ds:itemID="{C9F27BF2-F9EF-4D34-87AA-F1894485F5C8}">
+<ds:datastoreItem xmlns:ds="http://schemas.openxmlformats.org/officeDocument/2006/customXml" ds:itemID="{DF88E22E-2A4B-4FB1-9848-BF16E7DBE74B}">
   <ds:schemaRefs>
-    <ds:schemaRef ds:uri="http://schemas.microsoft.com/office/2006/metadata/contentType"/>
-    <ds:schemaRef ds:uri="http://schemas.microsoft.com/office/2006/metadata/properties/metaAttributes"/>
-    <ds:schemaRef ds:uri="http://www.w3.org/2001/XMLSchema"/>
+    <ds:schemaRef ds:uri="http://schemas.microsoft.com/office/2006/documentManagement/types"/>
+    <ds:schemaRef ds:uri="http://purl.org/dc/dcmitype/"/>
     <ds:schemaRef ds:uri="http://schemas.microsoft.com/office/2006/metadata/properties"/>
+    <ds:schemaRef ds:uri="http://purl.org/dc/terms/"/>
     <ds:schemaRef ds:uri="http://schemas.openxmlformats.org/package/2006/metadata/core-properties"/>
+    <ds:schemaRef ds:uri="http://www.w3.org/XML/1998/namespace"/>
     <ds:schemaRef ds:uri="http://purl.org/dc/elements/1.1/"/>
-    <ds:schemaRef ds:uri="http://purl.org/dc/terms/"/>
-    <ds:schemaRef ds:uri="http://schemas.microsoft.com/office/internal/2005/internalDocumentation"/>
   </ds:schemaRefs>
 </ds:datastoreItem>
 </file>
@@ -21287,15 +24734,16 @@
 </file>
 
 <file path=customXml/itemProps3.xml><?xml version="1.0" encoding="utf-8"?>
-<ds:datastoreItem xmlns:ds="http://schemas.openxmlformats.org/officeDocument/2006/customXml" ds:itemID="{DF88E22E-2A4B-4FB1-9848-BF16E7DBE74B}">
+<ds:datastoreItem xmlns:ds="http://schemas.openxmlformats.org/officeDocument/2006/customXml" ds:itemID="{C9F27BF2-F9EF-4D34-87AA-F1894485F5C8}">
   <ds:schemaRefs>
-    <ds:schemaRef ds:uri="http://schemas.microsoft.com/office/2006/documentManagement/types"/>
-    <ds:schemaRef ds:uri="http://purl.org/dc/dcmitype/"/>
+    <ds:schemaRef ds:uri="http://schemas.microsoft.com/office/2006/metadata/contentType"/>
+    <ds:schemaRef ds:uri="http://schemas.microsoft.com/office/2006/metadata/properties/metaAttributes"/>
+    <ds:schemaRef ds:uri="http://www.w3.org/2001/XMLSchema"/>
     <ds:schemaRef ds:uri="http://schemas.microsoft.com/office/2006/metadata/properties"/>
+    <ds:schemaRef ds:uri="http://schemas.openxmlformats.org/package/2006/metadata/core-properties"/>
+    <ds:schemaRef ds:uri="http://purl.org/dc/elements/1.1/"/>
     <ds:schemaRef ds:uri="http://purl.org/dc/terms/"/>
-    <ds:schemaRef ds:uri="http://schemas.openxmlformats.org/package/2006/metadata/core-properties"/>
-    <ds:schemaRef ds:uri="http://www.w3.org/XML/1998/namespace"/>
-    <ds:schemaRef ds:uri="http://purl.org/dc/elements/1.1/"/>
+    <ds:schemaRef ds:uri="http://schemas.microsoft.com/office/internal/2005/internalDocumentation"/>
   </ds:schemaRefs>
 </ds:datastoreItem>
 </file>
</xml_diff>